<commit_message>
summarized some info about report types to PPT, added PNG of Start of EER Draft, added .txt file with link to Lucid to edit EER
</commit_message>
<xml_diff>
--- a/CS6400 project phase one.pptx
+++ b/CS6400 project phase one.pptx
@@ -5,20 +5,21 @@
     <p:sldMasterId id="2147483659" r:id="rId1"/>
   </p:sldMasterIdLst>
   <p:notesMasterIdLst>
-    <p:notesMasterId r:id="rId13"/>
+    <p:notesMasterId r:id="rId14"/>
   </p:notesMasterIdLst>
   <p:sldIdLst>
     <p:sldId id="256" r:id="rId2"/>
     <p:sldId id="257" r:id="rId3"/>
     <p:sldId id="258" r:id="rId4"/>
     <p:sldId id="259" r:id="rId5"/>
-    <p:sldId id="260" r:id="rId6"/>
-    <p:sldId id="261" r:id="rId7"/>
-    <p:sldId id="262" r:id="rId8"/>
-    <p:sldId id="263" r:id="rId9"/>
-    <p:sldId id="265" r:id="rId10"/>
-    <p:sldId id="267" r:id="rId11"/>
-    <p:sldId id="264" r:id="rId12"/>
+    <p:sldId id="268" r:id="rId6"/>
+    <p:sldId id="260" r:id="rId7"/>
+    <p:sldId id="261" r:id="rId8"/>
+    <p:sldId id="262" r:id="rId9"/>
+    <p:sldId id="263" r:id="rId10"/>
+    <p:sldId id="265" r:id="rId11"/>
+    <p:sldId id="267" r:id="rId12"/>
+    <p:sldId id="264" r:id="rId13"/>
   </p:sldIdLst>
   <p:sldSz cx="9144000" cy="5143500" type="screen16x9"/>
   <p:notesSz cx="6858000" cy="9144000"/>
@@ -1052,7 +1053,7 @@
         </p:nvSpPr>
         <p:spPr>
           <a:xfrm>
-            <a:off x="381300" y="685800"/>
+            <a:off x="381000" y="685800"/>
             <a:ext cx="6096000" cy="3429000"/>
           </a:xfrm>
           <a:custGeom>
@@ -6635,6 +6636,1878 @@
           <a:p>
             <a:r>
               <a:rPr lang="en-US" sz="2000" dirty="0"/>
+              <a:t>Data Type and Formatting</a:t>
+            </a:r>
+          </a:p>
+        </p:txBody>
+      </p:sp>
+      <p:graphicFrame>
+        <p:nvGraphicFramePr>
+          <p:cNvPr id="4" name="Table 3">
+            <a:extLst>
+              <a:ext uri="{FF2B5EF4-FFF2-40B4-BE49-F238E27FC236}">
+                <a16:creationId xmlns:a16="http://schemas.microsoft.com/office/drawing/2014/main" id="{39085AC7-9D09-D178-9B5E-E4422F65A248}"/>
+              </a:ext>
+            </a:extLst>
+          </p:cNvPr>
+          <p:cNvGraphicFramePr>
+            <a:graphicFrameLocks noGrp="1"/>
+          </p:cNvGraphicFramePr>
+          <p:nvPr>
+            <p:extLst>
+              <p:ext uri="{D42A27DB-BD31-4B8C-83A1-F6EECF244321}">
+                <p14:modId xmlns:p14="http://schemas.microsoft.com/office/powerpoint/2010/main" val="4279333404"/>
+              </p:ext>
+            </p:extLst>
+          </p:nvPr>
+        </p:nvGraphicFramePr>
+        <p:xfrm>
+          <a:off x="296577" y="414923"/>
+          <a:ext cx="6958554" cy="4705917"/>
+        </p:xfrm>
+        <a:graphic>
+          <a:graphicData uri="http://schemas.openxmlformats.org/drawingml/2006/table">
+            <a:tbl>
+              <a:tblPr firstRow="1" bandRow="1">
+                <a:tableStyleId>{2E69291B-44AE-4880-B0DB-54CA540F50CF}</a:tableStyleId>
+              </a:tblPr>
+              <a:tblGrid>
+                <a:gridCol w="2319518">
+                  <a:extLst>
+                    <a:ext uri="{9D8B030D-6E8A-4147-A177-3AD203B41FA5}">
+                      <a16:colId xmlns:a16="http://schemas.microsoft.com/office/drawing/2014/main" val="832677790"/>
+                    </a:ext>
+                  </a:extLst>
+                </a:gridCol>
+                <a:gridCol w="2319518">
+                  <a:extLst>
+                    <a:ext uri="{9D8B030D-6E8A-4147-A177-3AD203B41FA5}">
+                      <a16:colId xmlns:a16="http://schemas.microsoft.com/office/drawing/2014/main" val="4174454364"/>
+                    </a:ext>
+                  </a:extLst>
+                </a:gridCol>
+                <a:gridCol w="2319518">
+                  <a:extLst>
+                    <a:ext uri="{9D8B030D-6E8A-4147-A177-3AD203B41FA5}">
+                      <a16:colId xmlns:a16="http://schemas.microsoft.com/office/drawing/2014/main" val="217317370"/>
+                    </a:ext>
+                  </a:extLst>
+                </a:gridCol>
+              </a:tblGrid>
+              <a:tr h="0">
+                <a:tc>
+                  <a:txBody>
+                    <a:bodyPr/>
+                    <a:lstStyle/>
+                    <a:p>
+                      <a:r>
+                        <a:rPr lang="en-US" sz="800" dirty="0"/>
+                        <a:t>Value</a:t>
+                      </a:r>
+                    </a:p>
+                  </a:txBody>
+                  <a:tcPr/>
+                </a:tc>
+                <a:tc>
+                  <a:txBody>
+                    <a:bodyPr/>
+                    <a:lstStyle/>
+                    <a:p>
+                      <a:r>
+                        <a:rPr lang="en-US" sz="800" dirty="0"/>
+                        <a:t>Type</a:t>
+                      </a:r>
+                    </a:p>
+                  </a:txBody>
+                  <a:tcPr/>
+                </a:tc>
+                <a:tc>
+                  <a:txBody>
+                    <a:bodyPr/>
+                    <a:lstStyle/>
+                    <a:p>
+                      <a:r>
+                        <a:rPr lang="en-US" sz="800" dirty="0"/>
+                        <a:t>Format</a:t>
+                      </a:r>
+                    </a:p>
+                  </a:txBody>
+                  <a:tcPr/>
+                </a:tc>
+                <a:extLst>
+                  <a:ext uri="{0D108BD9-81ED-4DB2-BD59-A6C34878D82A}">
+                    <a16:rowId xmlns:a16="http://schemas.microsoft.com/office/drawing/2014/main" val="3111753539"/>
+                  </a:ext>
+                </a:extLst>
+              </a:tr>
+              <a:tr h="176577">
+                <a:tc>
+                  <a:txBody>
+                    <a:bodyPr/>
+                    <a:lstStyle/>
+                    <a:p>
+                      <a:pPr marL="0" marR="0" lvl="0" indent="0" algn="l" defTabSz="914400" rtl="0" eaLnBrk="1" fontAlgn="auto" latinLnBrk="0" hangingPunct="1">
+                        <a:lnSpc>
+                          <a:spcPct val="100000"/>
+                        </a:lnSpc>
+                        <a:spcBef>
+                          <a:spcPts val="0"/>
+                        </a:spcBef>
+                        <a:spcAft>
+                          <a:spcPts val="0"/>
+                        </a:spcAft>
+                        <a:buClr>
+                          <a:srgbClr val="000000"/>
+                        </a:buClr>
+                        <a:buSzTx/>
+                        <a:buFont typeface="Arial"/>
+                        <a:buNone/>
+                        <a:tabLst/>
+                        <a:defRPr/>
+                      </a:pPr>
+                      <a:r>
+                        <a:rPr lang="en-US" sz="800" dirty="0"/>
+                        <a:t>Store Number</a:t>
+                      </a:r>
+                    </a:p>
+                  </a:txBody>
+                  <a:tcPr/>
+                </a:tc>
+                <a:tc>
+                  <a:txBody>
+                    <a:bodyPr/>
+                    <a:lstStyle/>
+                    <a:p>
+                      <a:r>
+                        <a:rPr lang="en-US" sz="800" dirty="0"/>
+                        <a:t>integer</a:t>
+                      </a:r>
+                    </a:p>
+                  </a:txBody>
+                  <a:tcPr/>
+                </a:tc>
+                <a:tc>
+                  <a:txBody>
+                    <a:bodyPr/>
+                    <a:lstStyle/>
+                    <a:p>
+                      <a:endParaRPr lang="en-US" sz="800"/>
+                    </a:p>
+                  </a:txBody>
+                  <a:tcPr/>
+                </a:tc>
+                <a:extLst>
+                  <a:ext uri="{0D108BD9-81ED-4DB2-BD59-A6C34878D82A}">
+                    <a16:rowId xmlns:a16="http://schemas.microsoft.com/office/drawing/2014/main" val="1972719646"/>
+                  </a:ext>
+                </a:extLst>
+              </a:tr>
+              <a:tr h="158482">
+                <a:tc>
+                  <a:txBody>
+                    <a:bodyPr/>
+                    <a:lstStyle/>
+                    <a:p>
+                      <a:pPr marL="0" marR="0" lvl="0" indent="0" algn="l" defTabSz="914400" rtl="0" eaLnBrk="1" fontAlgn="auto" latinLnBrk="0" hangingPunct="1">
+                        <a:lnSpc>
+                          <a:spcPct val="100000"/>
+                        </a:lnSpc>
+                        <a:spcBef>
+                          <a:spcPts val="0"/>
+                        </a:spcBef>
+                        <a:spcAft>
+                          <a:spcPts val="0"/>
+                        </a:spcAft>
+                        <a:buClr>
+                          <a:srgbClr val="000000"/>
+                        </a:buClr>
+                        <a:buSzTx/>
+                        <a:buFont typeface="Arial"/>
+                        <a:buNone/>
+                        <a:tabLst/>
+                        <a:defRPr/>
+                      </a:pPr>
+                      <a:r>
+                        <a:rPr lang="en-US" sz="800" dirty="0"/>
+                        <a:t>Store Phone number</a:t>
+                      </a:r>
+                    </a:p>
+                  </a:txBody>
+                  <a:tcPr/>
+                </a:tc>
+                <a:tc>
+                  <a:txBody>
+                    <a:bodyPr/>
+                    <a:lstStyle/>
+                    <a:p>
+                      <a:r>
+                        <a:rPr lang="en-US" sz="800" dirty="0"/>
+                        <a:t>string or integer </a:t>
+                      </a:r>
+                    </a:p>
+                  </a:txBody>
+                  <a:tcPr/>
+                </a:tc>
+                <a:tc>
+                  <a:txBody>
+                    <a:bodyPr/>
+                    <a:lstStyle/>
+                    <a:p>
+                      <a:pPr marL="0" marR="0" lvl="0" indent="0" algn="l" defTabSz="914400" rtl="0" eaLnBrk="1" fontAlgn="auto" latinLnBrk="0" hangingPunct="1">
+                        <a:lnSpc>
+                          <a:spcPct val="100000"/>
+                        </a:lnSpc>
+                        <a:spcBef>
+                          <a:spcPts val="0"/>
+                        </a:spcBef>
+                        <a:spcAft>
+                          <a:spcPts val="0"/>
+                        </a:spcAft>
+                        <a:buClr>
+                          <a:srgbClr val="000000"/>
+                        </a:buClr>
+                        <a:buSzTx/>
+                        <a:buFont typeface="Arial"/>
+                        <a:buNone/>
+                        <a:tabLst/>
+                        <a:defRPr/>
+                      </a:pPr>
+                      <a:r>
+                        <a:rPr lang="en-US" sz="800" dirty="0"/>
+                        <a:t>10 digit phone number,  (_ _ _)-_ _ _-_ _ _ _</a:t>
+                      </a:r>
+                    </a:p>
+                  </a:txBody>
+                  <a:tcPr/>
+                </a:tc>
+                <a:extLst>
+                  <a:ext uri="{0D108BD9-81ED-4DB2-BD59-A6C34878D82A}">
+                    <a16:rowId xmlns:a16="http://schemas.microsoft.com/office/drawing/2014/main" val="3005522037"/>
+                  </a:ext>
+                </a:extLst>
+              </a:tr>
+              <a:tr h="0">
+                <a:tc>
+                  <a:txBody>
+                    <a:bodyPr/>
+                    <a:lstStyle/>
+                    <a:p>
+                      <a:pPr marL="0" marR="0" lvl="0" indent="0" algn="l" defTabSz="914400" rtl="0" eaLnBrk="1" fontAlgn="auto" latinLnBrk="0" hangingPunct="1">
+                        <a:lnSpc>
+                          <a:spcPct val="100000"/>
+                        </a:lnSpc>
+                        <a:spcBef>
+                          <a:spcPts val="0"/>
+                        </a:spcBef>
+                        <a:spcAft>
+                          <a:spcPts val="0"/>
+                        </a:spcAft>
+                        <a:buClr>
+                          <a:srgbClr val="000000"/>
+                        </a:buClr>
+                        <a:buSzTx/>
+                        <a:buFont typeface="Arial"/>
+                        <a:buNone/>
+                        <a:tabLst/>
+                        <a:defRPr/>
+                      </a:pPr>
+                      <a:r>
+                        <a:rPr lang="en-US" sz="800" dirty="0"/>
+                        <a:t>Store district</a:t>
+                      </a:r>
+                    </a:p>
+                  </a:txBody>
+                  <a:tcPr/>
+                </a:tc>
+                <a:tc>
+                  <a:txBody>
+                    <a:bodyPr/>
+                    <a:lstStyle/>
+                    <a:p>
+                      <a:r>
+                        <a:rPr lang="en-US" sz="800" dirty="0"/>
+                        <a:t>String</a:t>
+                      </a:r>
+                    </a:p>
+                  </a:txBody>
+                  <a:tcPr/>
+                </a:tc>
+                <a:tc>
+                  <a:txBody>
+                    <a:bodyPr/>
+                    <a:lstStyle/>
+                    <a:p>
+                      <a:endParaRPr lang="en-US" sz="800" dirty="0"/>
+                    </a:p>
+                  </a:txBody>
+                  <a:tcPr/>
+                </a:tc>
+                <a:extLst>
+                  <a:ext uri="{0D108BD9-81ED-4DB2-BD59-A6C34878D82A}">
+                    <a16:rowId xmlns:a16="http://schemas.microsoft.com/office/drawing/2014/main" val="2963047820"/>
+                  </a:ext>
+                </a:extLst>
+              </a:tr>
+              <a:tr h="0">
+                <a:tc>
+                  <a:txBody>
+                    <a:bodyPr/>
+                    <a:lstStyle/>
+                    <a:p>
+                      <a:pPr marL="0" marR="0" lvl="0" indent="0" algn="l" defTabSz="914400" rtl="0" eaLnBrk="1" fontAlgn="auto" latinLnBrk="0" hangingPunct="1">
+                        <a:lnSpc>
+                          <a:spcPct val="100000"/>
+                        </a:lnSpc>
+                        <a:spcBef>
+                          <a:spcPts val="0"/>
+                        </a:spcBef>
+                        <a:spcAft>
+                          <a:spcPts val="0"/>
+                        </a:spcAft>
+                        <a:buClr>
+                          <a:srgbClr val="000000"/>
+                        </a:buClr>
+                        <a:buSzTx/>
+                        <a:buFont typeface="Arial"/>
+                        <a:buNone/>
+                        <a:tabLst/>
+                        <a:defRPr/>
+                      </a:pPr>
+                      <a:r>
+                        <a:rPr lang="en-US" sz="800" dirty="0"/>
+                        <a:t>District number </a:t>
+                      </a:r>
+                    </a:p>
+                  </a:txBody>
+                  <a:tcPr/>
+                </a:tc>
+                <a:tc>
+                  <a:txBody>
+                    <a:bodyPr/>
+                    <a:lstStyle/>
+                    <a:p>
+                      <a:pPr marL="0" marR="0" lvl="0" indent="0" algn="l" defTabSz="914400" rtl="0" eaLnBrk="1" fontAlgn="auto" latinLnBrk="0" hangingPunct="1">
+                        <a:lnSpc>
+                          <a:spcPct val="100000"/>
+                        </a:lnSpc>
+                        <a:spcBef>
+                          <a:spcPts val="0"/>
+                        </a:spcBef>
+                        <a:spcAft>
+                          <a:spcPts val="0"/>
+                        </a:spcAft>
+                        <a:buClr>
+                          <a:srgbClr val="000000"/>
+                        </a:buClr>
+                        <a:buSzTx/>
+                        <a:buFont typeface="Arial"/>
+                        <a:buNone/>
+                        <a:tabLst/>
+                        <a:defRPr/>
+                      </a:pPr>
+                      <a:r>
+                        <a:rPr lang="en-US" sz="800" dirty="0"/>
+                        <a:t>integer </a:t>
+                      </a:r>
+                    </a:p>
+                  </a:txBody>
+                  <a:tcPr/>
+                </a:tc>
+                <a:tc>
+                  <a:txBody>
+                    <a:bodyPr/>
+                    <a:lstStyle/>
+                    <a:p>
+                      <a:endParaRPr lang="en-US" sz="800"/>
+                    </a:p>
+                  </a:txBody>
+                  <a:tcPr/>
+                </a:tc>
+                <a:extLst>
+                  <a:ext uri="{0D108BD9-81ED-4DB2-BD59-A6C34878D82A}">
+                    <a16:rowId xmlns:a16="http://schemas.microsoft.com/office/drawing/2014/main" val="572236572"/>
+                  </a:ext>
+                </a:extLst>
+              </a:tr>
+              <a:tr h="0">
+                <a:tc>
+                  <a:txBody>
+                    <a:bodyPr/>
+                    <a:lstStyle/>
+                    <a:p>
+                      <a:pPr marL="0" marR="0" lvl="0" indent="0" algn="l" defTabSz="914400" rtl="0" eaLnBrk="1" fontAlgn="auto" latinLnBrk="0" hangingPunct="1">
+                        <a:lnSpc>
+                          <a:spcPct val="100000"/>
+                        </a:lnSpc>
+                        <a:spcBef>
+                          <a:spcPts val="0"/>
+                        </a:spcBef>
+                        <a:spcAft>
+                          <a:spcPts val="0"/>
+                        </a:spcAft>
+                        <a:buClr>
+                          <a:srgbClr val="000000"/>
+                        </a:buClr>
+                        <a:buSzTx/>
+                        <a:buFont typeface="Arial"/>
+                        <a:buNone/>
+                        <a:tabLst/>
+                        <a:defRPr/>
+                      </a:pPr>
+                      <a:r>
+                        <a:rPr lang="en-US" sz="800" dirty="0"/>
+                        <a:t>Store City</a:t>
+                      </a:r>
+                    </a:p>
+                  </a:txBody>
+                  <a:tcPr/>
+                </a:tc>
+                <a:tc>
+                  <a:txBody>
+                    <a:bodyPr/>
+                    <a:lstStyle/>
+                    <a:p>
+                      <a:r>
+                        <a:rPr lang="en-US" sz="800" dirty="0"/>
+                        <a:t>String</a:t>
+                      </a:r>
+                    </a:p>
+                  </a:txBody>
+                  <a:tcPr/>
+                </a:tc>
+                <a:tc>
+                  <a:txBody>
+                    <a:bodyPr/>
+                    <a:lstStyle/>
+                    <a:p>
+                      <a:endParaRPr lang="en-US" sz="800"/>
+                    </a:p>
+                  </a:txBody>
+                  <a:tcPr/>
+                </a:tc>
+                <a:extLst>
+                  <a:ext uri="{0D108BD9-81ED-4DB2-BD59-A6C34878D82A}">
+                    <a16:rowId xmlns:a16="http://schemas.microsoft.com/office/drawing/2014/main" val="651649283"/>
+                  </a:ext>
+                </a:extLst>
+              </a:tr>
+              <a:tr h="0">
+                <a:tc>
+                  <a:txBody>
+                    <a:bodyPr/>
+                    <a:lstStyle/>
+                    <a:p>
+                      <a:pPr marL="0" marR="0" lvl="0" indent="0" algn="l" defTabSz="914400" rtl="0" eaLnBrk="1" fontAlgn="auto" latinLnBrk="0" hangingPunct="1">
+                        <a:lnSpc>
+                          <a:spcPct val="100000"/>
+                        </a:lnSpc>
+                        <a:spcBef>
+                          <a:spcPts val="0"/>
+                        </a:spcBef>
+                        <a:spcAft>
+                          <a:spcPts val="0"/>
+                        </a:spcAft>
+                        <a:buClr>
+                          <a:srgbClr val="000000"/>
+                        </a:buClr>
+                        <a:buSzTx/>
+                        <a:buFont typeface="Arial"/>
+                        <a:buNone/>
+                        <a:tabLst/>
+                        <a:defRPr/>
+                      </a:pPr>
+                      <a:r>
+                        <a:rPr lang="en-US" sz="800" dirty="0"/>
+                        <a:t>State</a:t>
+                      </a:r>
+                    </a:p>
+                  </a:txBody>
+                  <a:tcPr/>
+                </a:tc>
+                <a:tc>
+                  <a:txBody>
+                    <a:bodyPr/>
+                    <a:lstStyle/>
+                    <a:p>
+                      <a:r>
+                        <a:rPr lang="en-US" sz="800" dirty="0"/>
+                        <a:t>String</a:t>
+                      </a:r>
+                    </a:p>
+                  </a:txBody>
+                  <a:tcPr/>
+                </a:tc>
+                <a:tc>
+                  <a:txBody>
+                    <a:bodyPr/>
+                    <a:lstStyle/>
+                    <a:p>
+                      <a:pPr marL="0" marR="0" lvl="0" indent="0" algn="l" defTabSz="914400" rtl="0" eaLnBrk="1" fontAlgn="auto" latinLnBrk="0" hangingPunct="1">
+                        <a:lnSpc>
+                          <a:spcPct val="100000"/>
+                        </a:lnSpc>
+                        <a:spcBef>
+                          <a:spcPts val="0"/>
+                        </a:spcBef>
+                        <a:spcAft>
+                          <a:spcPts val="0"/>
+                        </a:spcAft>
+                        <a:buClr>
+                          <a:srgbClr val="000000"/>
+                        </a:buClr>
+                        <a:buSzTx/>
+                        <a:buFont typeface="Arial"/>
+                        <a:buNone/>
+                        <a:tabLst/>
+                        <a:defRPr/>
+                      </a:pPr>
+                      <a:r>
+                        <a:rPr lang="en-US" sz="800" dirty="0"/>
+                        <a:t>2 letter abbreviation, ex. TX</a:t>
+                      </a:r>
+                    </a:p>
+                  </a:txBody>
+                  <a:tcPr/>
+                </a:tc>
+                <a:extLst>
+                  <a:ext uri="{0D108BD9-81ED-4DB2-BD59-A6C34878D82A}">
+                    <a16:rowId xmlns:a16="http://schemas.microsoft.com/office/drawing/2014/main" val="1576900529"/>
+                  </a:ext>
+                </a:extLst>
+              </a:tr>
+              <a:tr h="202830">
+                <a:tc>
+                  <a:txBody>
+                    <a:bodyPr/>
+                    <a:lstStyle/>
+                    <a:p>
+                      <a:pPr marL="0" marR="0" lvl="0" indent="0" algn="l" defTabSz="914400" rtl="0" eaLnBrk="1" fontAlgn="auto" latinLnBrk="0" hangingPunct="1">
+                        <a:lnSpc>
+                          <a:spcPct val="100000"/>
+                        </a:lnSpc>
+                        <a:spcBef>
+                          <a:spcPts val="0"/>
+                        </a:spcBef>
+                        <a:spcAft>
+                          <a:spcPts val="0"/>
+                        </a:spcAft>
+                        <a:buClr>
+                          <a:srgbClr val="000000"/>
+                        </a:buClr>
+                        <a:buSzTx/>
+                        <a:buFont typeface="Arial"/>
+                        <a:buNone/>
+                        <a:tabLst/>
+                        <a:defRPr/>
+                      </a:pPr>
+                      <a:r>
+                        <a:rPr lang="en-US" sz="800" dirty="0"/>
+                        <a:t>Product PID </a:t>
+                      </a:r>
+                    </a:p>
+                  </a:txBody>
+                  <a:tcPr/>
+                </a:tc>
+                <a:tc>
+                  <a:txBody>
+                    <a:bodyPr/>
+                    <a:lstStyle/>
+                    <a:p>
+                      <a:pPr marL="0" marR="0" lvl="0" indent="0" algn="l" defTabSz="914400" rtl="0" eaLnBrk="1" fontAlgn="auto" latinLnBrk="0" hangingPunct="1">
+                        <a:lnSpc>
+                          <a:spcPct val="100000"/>
+                        </a:lnSpc>
+                        <a:spcBef>
+                          <a:spcPts val="0"/>
+                        </a:spcBef>
+                        <a:spcAft>
+                          <a:spcPts val="0"/>
+                        </a:spcAft>
+                        <a:buClr>
+                          <a:srgbClr val="000000"/>
+                        </a:buClr>
+                        <a:buSzTx/>
+                        <a:buFont typeface="Arial"/>
+                        <a:buNone/>
+                        <a:tabLst/>
+                        <a:defRPr/>
+                      </a:pPr>
+                      <a:r>
+                        <a:rPr lang="en-US" sz="800" dirty="0"/>
+                        <a:t>(probably integer)</a:t>
+                      </a:r>
+                    </a:p>
+                  </a:txBody>
+                  <a:tcPr/>
+                </a:tc>
+                <a:tc>
+                  <a:txBody>
+                    <a:bodyPr/>
+                    <a:lstStyle/>
+                    <a:p>
+                      <a:endParaRPr lang="en-US" sz="800" dirty="0"/>
+                    </a:p>
+                  </a:txBody>
+                  <a:tcPr/>
+                </a:tc>
+                <a:extLst>
+                  <a:ext uri="{0D108BD9-81ED-4DB2-BD59-A6C34878D82A}">
+                    <a16:rowId xmlns:a16="http://schemas.microsoft.com/office/drawing/2014/main" val="1401638539"/>
+                  </a:ext>
+                </a:extLst>
+              </a:tr>
+              <a:tr h="213583">
+                <a:tc>
+                  <a:txBody>
+                    <a:bodyPr/>
+                    <a:lstStyle/>
+                    <a:p>
+                      <a:pPr marL="0" marR="0" lvl="0" indent="0" algn="l" defTabSz="914400" rtl="0" eaLnBrk="1" fontAlgn="auto" latinLnBrk="0" hangingPunct="1">
+                        <a:lnSpc>
+                          <a:spcPct val="100000"/>
+                        </a:lnSpc>
+                        <a:spcBef>
+                          <a:spcPts val="0"/>
+                        </a:spcBef>
+                        <a:spcAft>
+                          <a:spcPts val="0"/>
+                        </a:spcAft>
+                        <a:buClr>
+                          <a:srgbClr val="000000"/>
+                        </a:buClr>
+                        <a:buSzTx/>
+                        <a:buFont typeface="Arial"/>
+                        <a:buNone/>
+                        <a:tabLst/>
+                        <a:defRPr/>
+                      </a:pPr>
+                      <a:r>
+                        <a:rPr lang="en-US" sz="800" dirty="0"/>
+                        <a:t>Product name</a:t>
+                      </a:r>
+                    </a:p>
+                  </a:txBody>
+                  <a:tcPr/>
+                </a:tc>
+                <a:tc>
+                  <a:txBody>
+                    <a:bodyPr/>
+                    <a:lstStyle/>
+                    <a:p>
+                      <a:pPr marL="0" marR="0" lvl="0" indent="0" algn="l" defTabSz="914400" rtl="0" eaLnBrk="1" fontAlgn="auto" latinLnBrk="0" hangingPunct="1">
+                        <a:lnSpc>
+                          <a:spcPct val="100000"/>
+                        </a:lnSpc>
+                        <a:spcBef>
+                          <a:spcPts val="0"/>
+                        </a:spcBef>
+                        <a:spcAft>
+                          <a:spcPts val="0"/>
+                        </a:spcAft>
+                        <a:buClr>
+                          <a:srgbClr val="000000"/>
+                        </a:buClr>
+                        <a:buSzTx/>
+                        <a:buFont typeface="Arial"/>
+                        <a:buNone/>
+                        <a:tabLst/>
+                        <a:defRPr/>
+                      </a:pPr>
+                      <a:r>
+                        <a:rPr lang="en-US" sz="800" dirty="0"/>
+                        <a:t>string</a:t>
+                      </a:r>
+                    </a:p>
+                  </a:txBody>
+                  <a:tcPr/>
+                </a:tc>
+                <a:tc>
+                  <a:txBody>
+                    <a:bodyPr/>
+                    <a:lstStyle/>
+                    <a:p>
+                      <a:endParaRPr lang="en-US" sz="800" dirty="0"/>
+                    </a:p>
+                  </a:txBody>
+                  <a:tcPr/>
+                </a:tc>
+                <a:extLst>
+                  <a:ext uri="{0D108BD9-81ED-4DB2-BD59-A6C34878D82A}">
+                    <a16:rowId xmlns:a16="http://schemas.microsoft.com/office/drawing/2014/main" val="855919533"/>
+                  </a:ext>
+                </a:extLst>
+              </a:tr>
+              <a:tr h="139943">
+                <a:tc>
+                  <a:txBody>
+                    <a:bodyPr/>
+                    <a:lstStyle/>
+                    <a:p>
+                      <a:pPr marL="0" marR="0" lvl="0" indent="0" algn="l" defTabSz="914400" rtl="0" eaLnBrk="1" fontAlgn="auto" latinLnBrk="0" hangingPunct="1">
+                        <a:lnSpc>
+                          <a:spcPct val="100000"/>
+                        </a:lnSpc>
+                        <a:spcBef>
+                          <a:spcPts val="0"/>
+                        </a:spcBef>
+                        <a:spcAft>
+                          <a:spcPts val="0"/>
+                        </a:spcAft>
+                        <a:buClr>
+                          <a:srgbClr val="000000"/>
+                        </a:buClr>
+                        <a:buSzTx/>
+                        <a:buFont typeface="Arial"/>
+                        <a:buNone/>
+                        <a:tabLst/>
+                        <a:defRPr/>
+                      </a:pPr>
+                      <a:r>
+                        <a:rPr lang="en-US" sz="800" dirty="0"/>
+                        <a:t>Manufacturer name</a:t>
+                      </a:r>
+                    </a:p>
+                  </a:txBody>
+                  <a:tcPr/>
+                </a:tc>
+                <a:tc>
+                  <a:txBody>
+                    <a:bodyPr/>
+                    <a:lstStyle/>
+                    <a:p>
+                      <a:pPr marL="0" marR="0" lvl="0" indent="0" algn="l" defTabSz="914400" rtl="0" eaLnBrk="1" fontAlgn="auto" latinLnBrk="0" hangingPunct="1">
+                        <a:lnSpc>
+                          <a:spcPct val="100000"/>
+                        </a:lnSpc>
+                        <a:spcBef>
+                          <a:spcPts val="0"/>
+                        </a:spcBef>
+                        <a:spcAft>
+                          <a:spcPts val="0"/>
+                        </a:spcAft>
+                        <a:buClr>
+                          <a:srgbClr val="000000"/>
+                        </a:buClr>
+                        <a:buSzTx/>
+                        <a:buFont typeface="Arial"/>
+                        <a:buNone/>
+                        <a:tabLst/>
+                        <a:defRPr/>
+                      </a:pPr>
+                      <a:r>
+                        <a:rPr lang="en-US" sz="800" dirty="0"/>
+                        <a:t>string </a:t>
+                      </a:r>
+                    </a:p>
+                  </a:txBody>
+                  <a:tcPr/>
+                </a:tc>
+                <a:tc>
+                  <a:txBody>
+                    <a:bodyPr/>
+                    <a:lstStyle/>
+                    <a:p>
+                      <a:endParaRPr lang="en-US" sz="800" dirty="0"/>
+                    </a:p>
+                  </a:txBody>
+                  <a:tcPr/>
+                </a:tc>
+                <a:extLst>
+                  <a:ext uri="{0D108BD9-81ED-4DB2-BD59-A6C34878D82A}">
+                    <a16:rowId xmlns:a16="http://schemas.microsoft.com/office/drawing/2014/main" val="2377927883"/>
+                  </a:ext>
+                </a:extLst>
+              </a:tr>
+              <a:tr h="225134">
+                <a:tc>
+                  <a:txBody>
+                    <a:bodyPr/>
+                    <a:lstStyle/>
+                    <a:p>
+                      <a:pPr marL="0" marR="0" lvl="0" indent="0" algn="l" defTabSz="914400" rtl="0" eaLnBrk="1" fontAlgn="auto" latinLnBrk="0" hangingPunct="1">
+                        <a:lnSpc>
+                          <a:spcPct val="100000"/>
+                        </a:lnSpc>
+                        <a:spcBef>
+                          <a:spcPts val="0"/>
+                        </a:spcBef>
+                        <a:spcAft>
+                          <a:spcPts val="0"/>
+                        </a:spcAft>
+                        <a:buClr>
+                          <a:srgbClr val="000000"/>
+                        </a:buClr>
+                        <a:buSzTx/>
+                        <a:buFont typeface="Arial"/>
+                        <a:buNone/>
+                        <a:tabLst/>
+                        <a:defRPr/>
+                      </a:pPr>
+                      <a:r>
+                        <a:rPr lang="en-US" sz="800" dirty="0"/>
+                        <a:t>Product category </a:t>
+                      </a:r>
+                    </a:p>
+                  </a:txBody>
+                  <a:tcPr/>
+                </a:tc>
+                <a:tc>
+                  <a:txBody>
+                    <a:bodyPr/>
+                    <a:lstStyle/>
+                    <a:p>
+                      <a:pPr marL="0" marR="0" lvl="0" indent="0" algn="l" defTabSz="914400" rtl="0" eaLnBrk="1" fontAlgn="auto" latinLnBrk="0" hangingPunct="1">
+                        <a:lnSpc>
+                          <a:spcPct val="100000"/>
+                        </a:lnSpc>
+                        <a:spcBef>
+                          <a:spcPts val="0"/>
+                        </a:spcBef>
+                        <a:spcAft>
+                          <a:spcPts val="0"/>
+                        </a:spcAft>
+                        <a:buClr>
+                          <a:srgbClr val="000000"/>
+                        </a:buClr>
+                        <a:buSzTx/>
+                        <a:buFont typeface="Arial"/>
+                        <a:buNone/>
+                        <a:tabLst/>
+                        <a:defRPr/>
+                      </a:pPr>
+                      <a:r>
+                        <a:rPr lang="en-US" sz="800" dirty="0"/>
+                        <a:t>string </a:t>
+                      </a:r>
+                    </a:p>
+                  </a:txBody>
+                  <a:tcPr/>
+                </a:tc>
+                <a:tc>
+                  <a:txBody>
+                    <a:bodyPr/>
+                    <a:lstStyle/>
+                    <a:p>
+                      <a:endParaRPr lang="en-US" sz="800" dirty="0"/>
+                    </a:p>
+                  </a:txBody>
+                  <a:tcPr/>
+                </a:tc>
+                <a:extLst>
+                  <a:ext uri="{0D108BD9-81ED-4DB2-BD59-A6C34878D82A}">
+                    <a16:rowId xmlns:a16="http://schemas.microsoft.com/office/drawing/2014/main" val="3892633442"/>
+                  </a:ext>
+                </a:extLst>
+              </a:tr>
+              <a:tr h="0">
+                <a:tc>
+                  <a:txBody>
+                    <a:bodyPr/>
+                    <a:lstStyle/>
+                    <a:p>
+                      <a:pPr marL="0" marR="0" lvl="0" indent="0" algn="l" defTabSz="914400" rtl="0" eaLnBrk="1" fontAlgn="auto" latinLnBrk="0" hangingPunct="1">
+                        <a:lnSpc>
+                          <a:spcPct val="100000"/>
+                        </a:lnSpc>
+                        <a:spcBef>
+                          <a:spcPts val="0"/>
+                        </a:spcBef>
+                        <a:spcAft>
+                          <a:spcPts val="0"/>
+                        </a:spcAft>
+                        <a:buClr>
+                          <a:srgbClr val="000000"/>
+                        </a:buClr>
+                        <a:buSzTx/>
+                        <a:buFont typeface="Arial"/>
+                        <a:buNone/>
+                        <a:tabLst/>
+                        <a:defRPr/>
+                      </a:pPr>
+                      <a:r>
+                        <a:rPr lang="en-US" sz="800" dirty="0"/>
+                        <a:t>Retail price</a:t>
+                      </a:r>
+                    </a:p>
+                  </a:txBody>
+                  <a:tcPr/>
+                </a:tc>
+                <a:tc>
+                  <a:txBody>
+                    <a:bodyPr/>
+                    <a:lstStyle/>
+                    <a:p>
+                      <a:pPr marL="0" marR="0" lvl="0" indent="0" algn="l" defTabSz="914400" rtl="0" eaLnBrk="1" fontAlgn="auto" latinLnBrk="0" hangingPunct="1">
+                        <a:lnSpc>
+                          <a:spcPct val="100000"/>
+                        </a:lnSpc>
+                        <a:spcBef>
+                          <a:spcPts val="0"/>
+                        </a:spcBef>
+                        <a:spcAft>
+                          <a:spcPts val="0"/>
+                        </a:spcAft>
+                        <a:buClr>
+                          <a:srgbClr val="000000"/>
+                        </a:buClr>
+                        <a:buSzTx/>
+                        <a:buFont typeface="Arial"/>
+                        <a:buNone/>
+                        <a:tabLst/>
+                        <a:defRPr/>
+                      </a:pPr>
+                      <a:r>
+                        <a:rPr lang="en-US" sz="800" dirty="0"/>
+                        <a:t>Float</a:t>
+                      </a:r>
+                    </a:p>
+                  </a:txBody>
+                  <a:tcPr/>
+                </a:tc>
+                <a:tc>
+                  <a:txBody>
+                    <a:bodyPr/>
+                    <a:lstStyle/>
+                    <a:p>
+                      <a:pPr marL="0" marR="0" lvl="0" indent="0" algn="l" defTabSz="914400" rtl="0" eaLnBrk="1" fontAlgn="auto" latinLnBrk="0" hangingPunct="1">
+                        <a:lnSpc>
+                          <a:spcPct val="100000"/>
+                        </a:lnSpc>
+                        <a:spcBef>
+                          <a:spcPts val="0"/>
+                        </a:spcBef>
+                        <a:spcAft>
+                          <a:spcPts val="0"/>
+                        </a:spcAft>
+                        <a:buClr>
+                          <a:srgbClr val="000000"/>
+                        </a:buClr>
+                        <a:buSzTx/>
+                        <a:buFont typeface="Arial"/>
+                        <a:buNone/>
+                        <a:tabLst/>
+                        <a:defRPr/>
+                      </a:pPr>
+                      <a:r>
+                        <a:rPr lang="en-US" sz="800" dirty="0"/>
+                        <a:t>2 decimal places</a:t>
+                      </a:r>
+                    </a:p>
+                  </a:txBody>
+                  <a:tcPr/>
+                </a:tc>
+                <a:extLst>
+                  <a:ext uri="{0D108BD9-81ED-4DB2-BD59-A6C34878D82A}">
+                    <a16:rowId xmlns:a16="http://schemas.microsoft.com/office/drawing/2014/main" val="3733738910"/>
+                  </a:ext>
+                </a:extLst>
+              </a:tr>
+              <a:tr h="0">
+                <a:tc>
+                  <a:txBody>
+                    <a:bodyPr/>
+                    <a:lstStyle/>
+                    <a:p>
+                      <a:pPr marL="0" marR="0" lvl="0" indent="0" algn="l" defTabSz="914400" rtl="0" eaLnBrk="1" fontAlgn="auto" latinLnBrk="0" hangingPunct="1">
+                        <a:lnSpc>
+                          <a:spcPct val="100000"/>
+                        </a:lnSpc>
+                        <a:spcBef>
+                          <a:spcPts val="0"/>
+                        </a:spcBef>
+                        <a:spcAft>
+                          <a:spcPts val="0"/>
+                        </a:spcAft>
+                        <a:buClr>
+                          <a:srgbClr val="000000"/>
+                        </a:buClr>
+                        <a:buSzTx/>
+                        <a:buFont typeface="Arial"/>
+                        <a:buNone/>
+                        <a:tabLst/>
+                        <a:defRPr/>
+                      </a:pPr>
+                      <a:r>
+                        <a:rPr lang="en-US" sz="800" dirty="0"/>
+                        <a:t>Discount date</a:t>
+                      </a:r>
+                    </a:p>
+                  </a:txBody>
+                  <a:tcPr/>
+                </a:tc>
+                <a:tc>
+                  <a:txBody>
+                    <a:bodyPr/>
+                    <a:lstStyle/>
+                    <a:p>
+                      <a:pPr marL="0" marR="0" lvl="0" indent="0" algn="l" defTabSz="914400" rtl="0" eaLnBrk="1" fontAlgn="auto" latinLnBrk="0" hangingPunct="1">
+                        <a:lnSpc>
+                          <a:spcPct val="100000"/>
+                        </a:lnSpc>
+                        <a:spcBef>
+                          <a:spcPts val="0"/>
+                        </a:spcBef>
+                        <a:spcAft>
+                          <a:spcPts val="0"/>
+                        </a:spcAft>
+                        <a:buClr>
+                          <a:srgbClr val="000000"/>
+                        </a:buClr>
+                        <a:buSzTx/>
+                        <a:buFont typeface="Arial"/>
+                        <a:buNone/>
+                        <a:tabLst/>
+                        <a:defRPr/>
+                      </a:pPr>
+                      <a:endParaRPr lang="en-US" sz="800" dirty="0"/>
+                    </a:p>
+                  </a:txBody>
+                  <a:tcPr/>
+                </a:tc>
+                <a:tc>
+                  <a:txBody>
+                    <a:bodyPr/>
+                    <a:lstStyle/>
+                    <a:p>
+                      <a:r>
+                        <a:rPr lang="en-US" sz="800" dirty="0"/>
+                        <a:t>mm-dd-</a:t>
+                      </a:r>
+                      <a:r>
+                        <a:rPr lang="en-US" sz="800" dirty="0" err="1"/>
+                        <a:t>yyyy</a:t>
+                      </a:r>
+                      <a:endParaRPr lang="en-US" sz="800" dirty="0"/>
+                    </a:p>
+                  </a:txBody>
+                  <a:tcPr/>
+                </a:tc>
+                <a:extLst>
+                  <a:ext uri="{0D108BD9-81ED-4DB2-BD59-A6C34878D82A}">
+                    <a16:rowId xmlns:a16="http://schemas.microsoft.com/office/drawing/2014/main" val="739670954"/>
+                  </a:ext>
+                </a:extLst>
+              </a:tr>
+              <a:tr h="0">
+                <a:tc>
+                  <a:txBody>
+                    <a:bodyPr/>
+                    <a:lstStyle/>
+                    <a:p>
+                      <a:pPr marL="0" marR="0" lvl="0" indent="0" algn="l" defTabSz="914400" rtl="0" eaLnBrk="1" fontAlgn="auto" latinLnBrk="0" hangingPunct="1">
+                        <a:lnSpc>
+                          <a:spcPct val="100000"/>
+                        </a:lnSpc>
+                        <a:spcBef>
+                          <a:spcPts val="0"/>
+                        </a:spcBef>
+                        <a:spcAft>
+                          <a:spcPts val="0"/>
+                        </a:spcAft>
+                        <a:buClr>
+                          <a:srgbClr val="000000"/>
+                        </a:buClr>
+                        <a:buSzTx/>
+                        <a:buFont typeface="Arial"/>
+                        <a:buNone/>
+                        <a:tabLst/>
+                        <a:defRPr/>
+                      </a:pPr>
+                      <a:r>
+                        <a:rPr lang="en-US" sz="800" dirty="0"/>
+                        <a:t>Discount price</a:t>
+                      </a:r>
+                    </a:p>
+                  </a:txBody>
+                  <a:tcPr/>
+                </a:tc>
+                <a:tc>
+                  <a:txBody>
+                    <a:bodyPr/>
+                    <a:lstStyle/>
+                    <a:p>
+                      <a:pPr marL="0" marR="0" lvl="0" indent="0" algn="l" defTabSz="914400" rtl="0" eaLnBrk="1" fontAlgn="auto" latinLnBrk="0" hangingPunct="1">
+                        <a:lnSpc>
+                          <a:spcPct val="100000"/>
+                        </a:lnSpc>
+                        <a:spcBef>
+                          <a:spcPts val="0"/>
+                        </a:spcBef>
+                        <a:spcAft>
+                          <a:spcPts val="0"/>
+                        </a:spcAft>
+                        <a:buClr>
+                          <a:srgbClr val="000000"/>
+                        </a:buClr>
+                        <a:buSzTx/>
+                        <a:buFont typeface="Arial"/>
+                        <a:buNone/>
+                        <a:tabLst/>
+                        <a:defRPr/>
+                      </a:pPr>
+                      <a:r>
+                        <a:rPr lang="en-US" sz="800" dirty="0"/>
+                        <a:t>Float</a:t>
+                      </a:r>
+                    </a:p>
+                  </a:txBody>
+                  <a:tcPr/>
+                </a:tc>
+                <a:tc>
+                  <a:txBody>
+                    <a:bodyPr/>
+                    <a:lstStyle/>
+                    <a:p>
+                      <a:pPr marL="0" marR="0" lvl="0" indent="0" algn="l" defTabSz="914400" rtl="0" eaLnBrk="1" fontAlgn="auto" latinLnBrk="0" hangingPunct="1">
+                        <a:lnSpc>
+                          <a:spcPct val="100000"/>
+                        </a:lnSpc>
+                        <a:spcBef>
+                          <a:spcPts val="0"/>
+                        </a:spcBef>
+                        <a:spcAft>
+                          <a:spcPts val="0"/>
+                        </a:spcAft>
+                        <a:buClr>
+                          <a:srgbClr val="000000"/>
+                        </a:buClr>
+                        <a:buSzTx/>
+                        <a:buFont typeface="Arial"/>
+                        <a:buNone/>
+                        <a:tabLst/>
+                        <a:defRPr/>
+                      </a:pPr>
+                      <a:r>
+                        <a:rPr lang="en-US" sz="800" dirty="0"/>
+                        <a:t>2 decimal places</a:t>
+                      </a:r>
+                    </a:p>
+                  </a:txBody>
+                  <a:tcPr/>
+                </a:tc>
+                <a:extLst>
+                  <a:ext uri="{0D108BD9-81ED-4DB2-BD59-A6C34878D82A}">
+                    <a16:rowId xmlns:a16="http://schemas.microsoft.com/office/drawing/2014/main" val="1642785460"/>
+                  </a:ext>
+                </a:extLst>
+              </a:tr>
+              <a:tr h="0">
+                <a:tc>
+                  <a:txBody>
+                    <a:bodyPr/>
+                    <a:lstStyle/>
+                    <a:p>
+                      <a:pPr marL="0" marR="0" lvl="0" indent="0" algn="l" defTabSz="914400" rtl="0" eaLnBrk="1" fontAlgn="auto" latinLnBrk="0" hangingPunct="1">
+                        <a:lnSpc>
+                          <a:spcPct val="100000"/>
+                        </a:lnSpc>
+                        <a:spcBef>
+                          <a:spcPts val="0"/>
+                        </a:spcBef>
+                        <a:spcAft>
+                          <a:spcPts val="0"/>
+                        </a:spcAft>
+                        <a:buClr>
+                          <a:srgbClr val="000000"/>
+                        </a:buClr>
+                        <a:buSzTx/>
+                        <a:buFont typeface="Arial"/>
+                        <a:buNone/>
+                        <a:tabLst/>
+                        <a:defRPr/>
+                      </a:pPr>
+                      <a:r>
+                        <a:rPr lang="en-US" sz="800" dirty="0"/>
+                        <a:t>Holiday name</a:t>
+                      </a:r>
+                    </a:p>
+                  </a:txBody>
+                  <a:tcPr/>
+                </a:tc>
+                <a:tc>
+                  <a:txBody>
+                    <a:bodyPr/>
+                    <a:lstStyle/>
+                    <a:p>
+                      <a:pPr marL="0" marR="0" lvl="0" indent="0" algn="l" defTabSz="914400" rtl="0" eaLnBrk="1" fontAlgn="auto" latinLnBrk="0" hangingPunct="1">
+                        <a:lnSpc>
+                          <a:spcPct val="100000"/>
+                        </a:lnSpc>
+                        <a:spcBef>
+                          <a:spcPts val="0"/>
+                        </a:spcBef>
+                        <a:spcAft>
+                          <a:spcPts val="0"/>
+                        </a:spcAft>
+                        <a:buClr>
+                          <a:srgbClr val="000000"/>
+                        </a:buClr>
+                        <a:buSzTx/>
+                        <a:buFont typeface="Arial"/>
+                        <a:buNone/>
+                        <a:tabLst/>
+                        <a:defRPr/>
+                      </a:pPr>
+                      <a:r>
+                        <a:rPr lang="en-US" sz="800" dirty="0"/>
+                        <a:t>String</a:t>
+                      </a:r>
+                    </a:p>
+                  </a:txBody>
+                  <a:tcPr/>
+                </a:tc>
+                <a:tc>
+                  <a:txBody>
+                    <a:bodyPr/>
+                    <a:lstStyle/>
+                    <a:p>
+                      <a:endParaRPr lang="en-US" sz="800" dirty="0"/>
+                    </a:p>
+                  </a:txBody>
+                  <a:tcPr/>
+                </a:tc>
+                <a:extLst>
+                  <a:ext uri="{0D108BD9-81ED-4DB2-BD59-A6C34878D82A}">
+                    <a16:rowId xmlns:a16="http://schemas.microsoft.com/office/drawing/2014/main" val="3438467564"/>
+                  </a:ext>
+                </a:extLst>
+              </a:tr>
+              <a:tr h="0">
+                <a:tc>
+                  <a:txBody>
+                    <a:bodyPr/>
+                    <a:lstStyle/>
+                    <a:p>
+                      <a:pPr marL="0" marR="0" lvl="0" indent="0" algn="l" defTabSz="914400" rtl="0" eaLnBrk="1" fontAlgn="auto" latinLnBrk="0" hangingPunct="1">
+                        <a:lnSpc>
+                          <a:spcPct val="100000"/>
+                        </a:lnSpc>
+                        <a:spcBef>
+                          <a:spcPts val="0"/>
+                        </a:spcBef>
+                        <a:spcAft>
+                          <a:spcPts val="0"/>
+                        </a:spcAft>
+                        <a:buClr>
+                          <a:srgbClr val="000000"/>
+                        </a:buClr>
+                        <a:buSzTx/>
+                        <a:buFont typeface="Arial"/>
+                        <a:buNone/>
+                        <a:tabLst/>
+                        <a:defRPr/>
+                      </a:pPr>
+                      <a:r>
+                        <a:rPr lang="en-US" sz="800" dirty="0"/>
+                        <a:t>Holiday date</a:t>
+                      </a:r>
+                    </a:p>
+                  </a:txBody>
+                  <a:tcPr/>
+                </a:tc>
+                <a:tc>
+                  <a:txBody>
+                    <a:bodyPr/>
+                    <a:lstStyle/>
+                    <a:p>
+                      <a:pPr marL="0" marR="0" lvl="0" indent="0" algn="l" defTabSz="914400" rtl="0" eaLnBrk="1" fontAlgn="auto" latinLnBrk="0" hangingPunct="1">
+                        <a:lnSpc>
+                          <a:spcPct val="100000"/>
+                        </a:lnSpc>
+                        <a:spcBef>
+                          <a:spcPts val="0"/>
+                        </a:spcBef>
+                        <a:spcAft>
+                          <a:spcPts val="0"/>
+                        </a:spcAft>
+                        <a:buClr>
+                          <a:srgbClr val="000000"/>
+                        </a:buClr>
+                        <a:buSzTx/>
+                        <a:buFont typeface="Arial"/>
+                        <a:buNone/>
+                        <a:tabLst/>
+                        <a:defRPr/>
+                      </a:pPr>
+                      <a:endParaRPr lang="en-US" sz="800" dirty="0"/>
+                    </a:p>
+                  </a:txBody>
+                  <a:tcPr/>
+                </a:tc>
+                <a:tc>
+                  <a:txBody>
+                    <a:bodyPr/>
+                    <a:lstStyle/>
+                    <a:p>
+                      <a:r>
+                        <a:rPr lang="en-US" sz="800" dirty="0"/>
+                        <a:t>mm-dd-</a:t>
+                      </a:r>
+                      <a:r>
+                        <a:rPr lang="en-US" sz="800" dirty="0" err="1"/>
+                        <a:t>yyyy</a:t>
+                      </a:r>
+                      <a:endParaRPr lang="en-US" sz="800" dirty="0"/>
+                    </a:p>
+                  </a:txBody>
+                  <a:tcPr/>
+                </a:tc>
+                <a:extLst>
+                  <a:ext uri="{0D108BD9-81ED-4DB2-BD59-A6C34878D82A}">
+                    <a16:rowId xmlns:a16="http://schemas.microsoft.com/office/drawing/2014/main" val="1757594505"/>
+                  </a:ext>
+                </a:extLst>
+              </a:tr>
+              <a:tr h="0">
+                <a:tc>
+                  <a:txBody>
+                    <a:bodyPr/>
+                    <a:lstStyle/>
+                    <a:p>
+                      <a:pPr marL="0" marR="0" lvl="0" indent="0" algn="l" defTabSz="914400" rtl="0" eaLnBrk="1" fontAlgn="auto" latinLnBrk="0" hangingPunct="1">
+                        <a:lnSpc>
+                          <a:spcPct val="100000"/>
+                        </a:lnSpc>
+                        <a:spcBef>
+                          <a:spcPts val="0"/>
+                        </a:spcBef>
+                        <a:spcAft>
+                          <a:spcPts val="0"/>
+                        </a:spcAft>
+                        <a:buClr>
+                          <a:srgbClr val="000000"/>
+                        </a:buClr>
+                        <a:buSzTx/>
+                        <a:buFont typeface="Arial"/>
+                        <a:buNone/>
+                        <a:tabLst/>
+                        <a:defRPr/>
+                      </a:pPr>
+                      <a:r>
+                        <a:rPr lang="en-US" sz="800" dirty="0"/>
+                        <a:t>Sold date</a:t>
+                      </a:r>
+                    </a:p>
+                  </a:txBody>
+                  <a:tcPr/>
+                </a:tc>
+                <a:tc>
+                  <a:txBody>
+                    <a:bodyPr/>
+                    <a:lstStyle/>
+                    <a:p>
+                      <a:pPr marL="0" marR="0" lvl="0" indent="0" algn="l" defTabSz="914400" rtl="0" eaLnBrk="1" fontAlgn="auto" latinLnBrk="0" hangingPunct="1">
+                        <a:lnSpc>
+                          <a:spcPct val="100000"/>
+                        </a:lnSpc>
+                        <a:spcBef>
+                          <a:spcPts val="0"/>
+                        </a:spcBef>
+                        <a:spcAft>
+                          <a:spcPts val="0"/>
+                        </a:spcAft>
+                        <a:buClr>
+                          <a:srgbClr val="000000"/>
+                        </a:buClr>
+                        <a:buSzTx/>
+                        <a:buFont typeface="Arial"/>
+                        <a:buNone/>
+                        <a:tabLst/>
+                        <a:defRPr/>
+                      </a:pPr>
+                      <a:endParaRPr lang="en-US" sz="800" dirty="0"/>
+                    </a:p>
+                  </a:txBody>
+                  <a:tcPr/>
+                </a:tc>
+                <a:tc>
+                  <a:txBody>
+                    <a:bodyPr/>
+                    <a:lstStyle/>
+                    <a:p>
+                      <a:pPr marL="0" marR="0" lvl="0" indent="0" algn="l" defTabSz="914400" rtl="0" eaLnBrk="1" fontAlgn="auto" latinLnBrk="0" hangingPunct="1">
+                        <a:lnSpc>
+                          <a:spcPct val="100000"/>
+                        </a:lnSpc>
+                        <a:spcBef>
+                          <a:spcPts val="0"/>
+                        </a:spcBef>
+                        <a:spcAft>
+                          <a:spcPts val="0"/>
+                        </a:spcAft>
+                        <a:buClr>
+                          <a:srgbClr val="000000"/>
+                        </a:buClr>
+                        <a:buSzTx/>
+                        <a:buFont typeface="Arial"/>
+                        <a:buNone/>
+                        <a:tabLst/>
+                        <a:defRPr/>
+                      </a:pPr>
+                      <a:r>
+                        <a:rPr lang="en-US" sz="800" dirty="0"/>
+                        <a:t>mm-dd-</a:t>
+                      </a:r>
+                      <a:r>
+                        <a:rPr lang="en-US" sz="800" dirty="0" err="1"/>
+                        <a:t>yyyy</a:t>
+                      </a:r>
+                      <a:endParaRPr lang="en-US" sz="800" dirty="0"/>
+                    </a:p>
+                  </a:txBody>
+                  <a:tcPr/>
+                </a:tc>
+                <a:extLst>
+                  <a:ext uri="{0D108BD9-81ED-4DB2-BD59-A6C34878D82A}">
+                    <a16:rowId xmlns:a16="http://schemas.microsoft.com/office/drawing/2014/main" val="3193344423"/>
+                  </a:ext>
+                </a:extLst>
+              </a:tr>
+              <a:tr h="0">
+                <a:tc>
+                  <a:txBody>
+                    <a:bodyPr/>
+                    <a:lstStyle/>
+                    <a:p>
+                      <a:pPr marL="0" marR="0" lvl="0" indent="0" algn="l" defTabSz="914400" rtl="0" eaLnBrk="1" fontAlgn="auto" latinLnBrk="0" hangingPunct="1">
+                        <a:lnSpc>
+                          <a:spcPct val="100000"/>
+                        </a:lnSpc>
+                        <a:spcBef>
+                          <a:spcPts val="0"/>
+                        </a:spcBef>
+                        <a:spcAft>
+                          <a:spcPts val="0"/>
+                        </a:spcAft>
+                        <a:buClr>
+                          <a:srgbClr val="000000"/>
+                        </a:buClr>
+                        <a:buSzTx/>
+                        <a:buFont typeface="Arial"/>
+                        <a:buNone/>
+                        <a:tabLst/>
+                        <a:defRPr/>
+                      </a:pPr>
+                      <a:r>
+                        <a:rPr lang="en-US" sz="800" dirty="0"/>
+                        <a:t>Sold Quantity</a:t>
+                      </a:r>
+                    </a:p>
+                  </a:txBody>
+                  <a:tcPr/>
+                </a:tc>
+                <a:tc>
+                  <a:txBody>
+                    <a:bodyPr/>
+                    <a:lstStyle/>
+                    <a:p>
+                      <a:pPr marL="0" marR="0" lvl="0" indent="0" algn="l" defTabSz="914400" rtl="0" eaLnBrk="1" fontAlgn="auto" latinLnBrk="0" hangingPunct="1">
+                        <a:lnSpc>
+                          <a:spcPct val="100000"/>
+                        </a:lnSpc>
+                        <a:spcBef>
+                          <a:spcPts val="0"/>
+                        </a:spcBef>
+                        <a:spcAft>
+                          <a:spcPts val="0"/>
+                        </a:spcAft>
+                        <a:buClr>
+                          <a:srgbClr val="000000"/>
+                        </a:buClr>
+                        <a:buSzTx/>
+                        <a:buFont typeface="Arial"/>
+                        <a:buNone/>
+                        <a:tabLst/>
+                        <a:defRPr/>
+                      </a:pPr>
+                      <a:r>
+                        <a:rPr lang="en-US" sz="800" dirty="0"/>
+                        <a:t>Integer</a:t>
+                      </a:r>
+                    </a:p>
+                  </a:txBody>
+                  <a:tcPr/>
+                </a:tc>
+                <a:tc>
+                  <a:txBody>
+                    <a:bodyPr/>
+                    <a:lstStyle/>
+                    <a:p>
+                      <a:endParaRPr lang="en-US" sz="800" dirty="0"/>
+                    </a:p>
+                  </a:txBody>
+                  <a:tcPr/>
+                </a:tc>
+                <a:extLst>
+                  <a:ext uri="{0D108BD9-81ED-4DB2-BD59-A6C34878D82A}">
+                    <a16:rowId xmlns:a16="http://schemas.microsoft.com/office/drawing/2014/main" val="3722479841"/>
+                  </a:ext>
+                </a:extLst>
+              </a:tr>
+              <a:tr h="0">
+                <a:tc>
+                  <a:txBody>
+                    <a:bodyPr/>
+                    <a:lstStyle/>
+                    <a:p>
+                      <a:pPr marL="0" marR="0" lvl="0" indent="0" algn="l" defTabSz="914400" rtl="0" eaLnBrk="1" fontAlgn="auto" latinLnBrk="0" hangingPunct="1">
+                        <a:lnSpc>
+                          <a:spcPct val="100000"/>
+                        </a:lnSpc>
+                        <a:spcBef>
+                          <a:spcPts val="0"/>
+                        </a:spcBef>
+                        <a:spcAft>
+                          <a:spcPts val="0"/>
+                        </a:spcAft>
+                        <a:buClr>
+                          <a:srgbClr val="000000"/>
+                        </a:buClr>
+                        <a:buSzTx/>
+                        <a:buFont typeface="Arial"/>
+                        <a:buNone/>
+                        <a:tabLst/>
+                        <a:defRPr/>
+                      </a:pPr>
+                      <a:endParaRPr lang="en-US" sz="800" dirty="0"/>
+                    </a:p>
+                  </a:txBody>
+                  <a:tcPr/>
+                </a:tc>
+                <a:tc>
+                  <a:txBody>
+                    <a:bodyPr/>
+                    <a:lstStyle/>
+                    <a:p>
+                      <a:pPr marL="0" marR="0" lvl="0" indent="0" algn="l" defTabSz="914400" rtl="0" eaLnBrk="1" fontAlgn="auto" latinLnBrk="0" hangingPunct="1">
+                        <a:lnSpc>
+                          <a:spcPct val="100000"/>
+                        </a:lnSpc>
+                        <a:spcBef>
+                          <a:spcPts val="0"/>
+                        </a:spcBef>
+                        <a:spcAft>
+                          <a:spcPts val="0"/>
+                        </a:spcAft>
+                        <a:buClr>
+                          <a:srgbClr val="000000"/>
+                        </a:buClr>
+                        <a:buSzTx/>
+                        <a:buFont typeface="Arial"/>
+                        <a:buNone/>
+                        <a:tabLst/>
+                        <a:defRPr/>
+                      </a:pPr>
+                      <a:endParaRPr lang="en-US" sz="800" dirty="0"/>
+                    </a:p>
+                  </a:txBody>
+                  <a:tcPr/>
+                </a:tc>
+                <a:tc>
+                  <a:txBody>
+                    <a:bodyPr/>
+                    <a:lstStyle/>
+                    <a:p>
+                      <a:endParaRPr lang="en-US" sz="800" dirty="0"/>
+                    </a:p>
+                  </a:txBody>
+                  <a:tcPr/>
+                </a:tc>
+                <a:extLst>
+                  <a:ext uri="{0D108BD9-81ED-4DB2-BD59-A6C34878D82A}">
+                    <a16:rowId xmlns:a16="http://schemas.microsoft.com/office/drawing/2014/main" val="3599112174"/>
+                  </a:ext>
+                </a:extLst>
+              </a:tr>
+              <a:tr h="0">
+                <a:tc>
+                  <a:txBody>
+                    <a:bodyPr/>
+                    <a:lstStyle/>
+                    <a:p>
+                      <a:pPr marL="0" marR="0" lvl="0" indent="0" algn="l" defTabSz="914400" rtl="0" eaLnBrk="1" fontAlgn="auto" latinLnBrk="0" hangingPunct="1">
+                        <a:lnSpc>
+                          <a:spcPct val="100000"/>
+                        </a:lnSpc>
+                        <a:spcBef>
+                          <a:spcPts val="0"/>
+                        </a:spcBef>
+                        <a:spcAft>
+                          <a:spcPts val="0"/>
+                        </a:spcAft>
+                        <a:buClr>
+                          <a:srgbClr val="000000"/>
+                        </a:buClr>
+                        <a:buSzTx/>
+                        <a:buFont typeface="Arial"/>
+                        <a:buNone/>
+                        <a:tabLst/>
+                        <a:defRPr/>
+                      </a:pPr>
+                      <a:endParaRPr lang="en-US" sz="800" dirty="0"/>
+                    </a:p>
+                  </a:txBody>
+                  <a:tcPr/>
+                </a:tc>
+                <a:tc>
+                  <a:txBody>
+                    <a:bodyPr/>
+                    <a:lstStyle/>
+                    <a:p>
+                      <a:pPr marL="0" marR="0" lvl="0" indent="0" algn="l" defTabSz="914400" rtl="0" eaLnBrk="1" fontAlgn="auto" latinLnBrk="0" hangingPunct="1">
+                        <a:lnSpc>
+                          <a:spcPct val="100000"/>
+                        </a:lnSpc>
+                        <a:spcBef>
+                          <a:spcPts val="0"/>
+                        </a:spcBef>
+                        <a:spcAft>
+                          <a:spcPts val="0"/>
+                        </a:spcAft>
+                        <a:buClr>
+                          <a:srgbClr val="000000"/>
+                        </a:buClr>
+                        <a:buSzTx/>
+                        <a:buFont typeface="Arial"/>
+                        <a:buNone/>
+                        <a:tabLst/>
+                        <a:defRPr/>
+                      </a:pPr>
+                      <a:endParaRPr lang="en-US" sz="800" dirty="0"/>
+                    </a:p>
+                  </a:txBody>
+                  <a:tcPr/>
+                </a:tc>
+                <a:tc>
+                  <a:txBody>
+                    <a:bodyPr/>
+                    <a:lstStyle/>
+                    <a:p>
+                      <a:endParaRPr lang="en-US" sz="800" dirty="0"/>
+                    </a:p>
+                  </a:txBody>
+                  <a:tcPr/>
+                </a:tc>
+                <a:extLst>
+                  <a:ext uri="{0D108BD9-81ED-4DB2-BD59-A6C34878D82A}">
+                    <a16:rowId xmlns:a16="http://schemas.microsoft.com/office/drawing/2014/main" val="4075383918"/>
+                  </a:ext>
+                </a:extLst>
+              </a:tr>
+              <a:tr h="0">
+                <a:tc>
+                  <a:txBody>
+                    <a:bodyPr/>
+                    <a:lstStyle/>
+                    <a:p>
+                      <a:pPr marL="0" marR="0" lvl="0" indent="0" algn="l" defTabSz="914400" rtl="0" eaLnBrk="1" fontAlgn="auto" latinLnBrk="0" hangingPunct="1">
+                        <a:lnSpc>
+                          <a:spcPct val="100000"/>
+                        </a:lnSpc>
+                        <a:spcBef>
+                          <a:spcPts val="0"/>
+                        </a:spcBef>
+                        <a:spcAft>
+                          <a:spcPts val="0"/>
+                        </a:spcAft>
+                        <a:buClr>
+                          <a:srgbClr val="000000"/>
+                        </a:buClr>
+                        <a:buSzTx/>
+                        <a:buFont typeface="Arial"/>
+                        <a:buNone/>
+                        <a:tabLst/>
+                        <a:defRPr/>
+                      </a:pPr>
+                      <a:endParaRPr lang="en-US" sz="800" dirty="0"/>
+                    </a:p>
+                  </a:txBody>
+                  <a:tcPr/>
+                </a:tc>
+                <a:tc>
+                  <a:txBody>
+                    <a:bodyPr/>
+                    <a:lstStyle/>
+                    <a:p>
+                      <a:pPr marL="0" marR="0" lvl="0" indent="0" algn="l" defTabSz="914400" rtl="0" eaLnBrk="1" fontAlgn="auto" latinLnBrk="0" hangingPunct="1">
+                        <a:lnSpc>
+                          <a:spcPct val="100000"/>
+                        </a:lnSpc>
+                        <a:spcBef>
+                          <a:spcPts val="0"/>
+                        </a:spcBef>
+                        <a:spcAft>
+                          <a:spcPts val="0"/>
+                        </a:spcAft>
+                        <a:buClr>
+                          <a:srgbClr val="000000"/>
+                        </a:buClr>
+                        <a:buSzTx/>
+                        <a:buFont typeface="Arial"/>
+                        <a:buNone/>
+                        <a:tabLst/>
+                        <a:defRPr/>
+                      </a:pPr>
+                      <a:endParaRPr lang="en-US" sz="800" dirty="0"/>
+                    </a:p>
+                  </a:txBody>
+                  <a:tcPr/>
+                </a:tc>
+                <a:tc>
+                  <a:txBody>
+                    <a:bodyPr/>
+                    <a:lstStyle/>
+                    <a:p>
+                      <a:endParaRPr lang="en-US" sz="800" dirty="0"/>
+                    </a:p>
+                  </a:txBody>
+                  <a:tcPr/>
+                </a:tc>
+                <a:extLst>
+                  <a:ext uri="{0D108BD9-81ED-4DB2-BD59-A6C34878D82A}">
+                    <a16:rowId xmlns:a16="http://schemas.microsoft.com/office/drawing/2014/main" val="2351806370"/>
+                  </a:ext>
+                </a:extLst>
+              </a:tr>
+              <a:tr h="0">
+                <a:tc>
+                  <a:txBody>
+                    <a:bodyPr/>
+                    <a:lstStyle/>
+                    <a:p>
+                      <a:pPr marL="0" marR="0" lvl="0" indent="0" algn="l" defTabSz="914400" rtl="0" eaLnBrk="1" fontAlgn="auto" latinLnBrk="0" hangingPunct="1">
+                        <a:lnSpc>
+                          <a:spcPct val="100000"/>
+                        </a:lnSpc>
+                        <a:spcBef>
+                          <a:spcPts val="0"/>
+                        </a:spcBef>
+                        <a:spcAft>
+                          <a:spcPts val="0"/>
+                        </a:spcAft>
+                        <a:buClr>
+                          <a:srgbClr val="000000"/>
+                        </a:buClr>
+                        <a:buSzTx/>
+                        <a:buFont typeface="Arial"/>
+                        <a:buNone/>
+                        <a:tabLst/>
+                        <a:defRPr/>
+                      </a:pPr>
+                      <a:endParaRPr lang="en-US" sz="800" dirty="0"/>
+                    </a:p>
+                  </a:txBody>
+                  <a:tcPr/>
+                </a:tc>
+                <a:tc>
+                  <a:txBody>
+                    <a:bodyPr/>
+                    <a:lstStyle/>
+                    <a:p>
+                      <a:pPr marL="0" marR="0" lvl="0" indent="0" algn="l" defTabSz="914400" rtl="0" eaLnBrk="1" fontAlgn="auto" latinLnBrk="0" hangingPunct="1">
+                        <a:lnSpc>
+                          <a:spcPct val="100000"/>
+                        </a:lnSpc>
+                        <a:spcBef>
+                          <a:spcPts val="0"/>
+                        </a:spcBef>
+                        <a:spcAft>
+                          <a:spcPts val="0"/>
+                        </a:spcAft>
+                        <a:buClr>
+                          <a:srgbClr val="000000"/>
+                        </a:buClr>
+                        <a:buSzTx/>
+                        <a:buFont typeface="Arial"/>
+                        <a:buNone/>
+                        <a:tabLst/>
+                        <a:defRPr/>
+                      </a:pPr>
+                      <a:endParaRPr lang="en-US" sz="800" dirty="0"/>
+                    </a:p>
+                  </a:txBody>
+                  <a:tcPr/>
+                </a:tc>
+                <a:tc>
+                  <a:txBody>
+                    <a:bodyPr/>
+                    <a:lstStyle/>
+                    <a:p>
+                      <a:endParaRPr lang="en-US" sz="800" dirty="0"/>
+                    </a:p>
+                  </a:txBody>
+                  <a:tcPr/>
+                </a:tc>
+                <a:extLst>
+                  <a:ext uri="{0D108BD9-81ED-4DB2-BD59-A6C34878D82A}">
+                    <a16:rowId xmlns:a16="http://schemas.microsoft.com/office/drawing/2014/main" val="1964201980"/>
+                  </a:ext>
+                </a:extLst>
+              </a:tr>
+            </a:tbl>
+          </a:graphicData>
+        </a:graphic>
+      </p:graphicFrame>
+    </p:spTree>
+    <p:extLst>
+      <p:ext uri="{BB962C8B-B14F-4D97-AF65-F5344CB8AC3E}">
+        <p14:creationId xmlns:p14="http://schemas.microsoft.com/office/powerpoint/2010/main" val="619591483"/>
+      </p:ext>
+    </p:extLst>
+  </p:cSld>
+  <p:clrMapOvr>
+    <a:masterClrMapping/>
+  </p:clrMapOvr>
+</p:sld>
+</file>
+
+<file path=ppt/slides/slide11.xml><?xml version="1.0" encoding="utf-8"?>
+<p:sld xmlns:a="http://schemas.openxmlformats.org/drawingml/2006/main" xmlns:r="http://schemas.openxmlformats.org/officeDocument/2006/relationships" xmlns:p="http://schemas.openxmlformats.org/presentationml/2006/main">
+  <p:cSld>
+    <p:spTree>
+      <p:nvGrpSpPr>
+        <p:cNvPr id="1" name=""/>
+        <p:cNvGrpSpPr/>
+        <p:nvPr/>
+      </p:nvGrpSpPr>
+      <p:grpSpPr>
+        <a:xfrm>
+          <a:off x="0" y="0"/>
+          <a:ext cx="0" cy="0"/>
+          <a:chOff x="0" y="0"/>
+          <a:chExt cx="0" cy="0"/>
+        </a:xfrm>
+      </p:grpSpPr>
+      <p:sp>
+        <p:nvSpPr>
+          <p:cNvPr id="2" name="Title 1">
+            <a:extLst>
+              <a:ext uri="{FF2B5EF4-FFF2-40B4-BE49-F238E27FC236}">
+                <a16:creationId xmlns:a16="http://schemas.microsoft.com/office/drawing/2014/main" id="{CDF68962-8381-E4DF-D093-81216B28C06A}"/>
+              </a:ext>
+            </a:extLst>
+          </p:cNvPr>
+          <p:cNvSpPr>
+            <a:spLocks noGrp="1"/>
+          </p:cNvSpPr>
+          <p:nvPr>
+            <p:ph type="title"/>
+          </p:nvPr>
+        </p:nvSpPr>
+        <p:spPr>
+          <a:xfrm>
+            <a:off x="246730" y="0"/>
+            <a:ext cx="8520600" cy="246955"/>
+          </a:xfrm>
+        </p:spPr>
+        <p:txBody>
+          <a:bodyPr>
+            <a:normAutofit fontScale="90000"/>
+          </a:bodyPr>
+          <a:lstStyle/>
+          <a:p>
+            <a:r>
+              <a:rPr lang="en-US" sz="2000" dirty="0"/>
               <a:t>Data Type and Formatting Cont.</a:t>
             </a:r>
           </a:p>
@@ -8403,7 +10276,7 @@
 </p:sld>
 </file>
 
-<file path=ppt/slides/slide11.xml><?xml version="1.0" encoding="utf-8"?>
+<file path=ppt/slides/slide12.xml><?xml version="1.0" encoding="utf-8"?>
 <p:sld xmlns:a="http://schemas.openxmlformats.org/drawingml/2006/main" xmlns:r="http://schemas.openxmlformats.org/officeDocument/2006/relationships" xmlns:p="http://schemas.openxmlformats.org/presentationml/2006/main">
   <p:cSld>
     <p:spTree>
@@ -9128,10 +11001,10 @@
               <a:buChar char="-"/>
             </a:pPr>
             <a:r>
-              <a:rPr lang="en"/>
+              <a:rPr lang="en" dirty="0"/>
               <a:t>Audit log entry created each time a report is viewed</a:t>
             </a:r>
-            <a:endParaRPr/>
+            <a:endParaRPr dirty="0"/>
           </a:p>
           <a:p>
             <a:pPr marL="457200" lvl="0" indent="-342900" algn="l" rtl="0">
@@ -9145,10 +11018,10 @@
               <a:buChar char="-"/>
             </a:pPr>
             <a:r>
-              <a:rPr lang="en"/>
+              <a:rPr lang="en" dirty="0"/>
               <a:t>Log entry contains employee ID, last name, and first name, and timestamp, and name of viewed report</a:t>
             </a:r>
-            <a:endParaRPr/>
+            <a:endParaRPr dirty="0"/>
           </a:p>
           <a:p>
             <a:pPr marL="457200" lvl="0" indent="-342900" algn="l" rtl="0">
@@ -9162,10 +11035,10 @@
               <a:buChar char="-"/>
             </a:pPr>
             <a:r>
-              <a:rPr lang="en"/>
+              <a:rPr lang="en" dirty="0"/>
               <a:t>List of all reports stored in db maintained by DBA</a:t>
             </a:r>
-            <a:endParaRPr/>
+            <a:endParaRPr dirty="0"/>
           </a:p>
           <a:p>
             <a:pPr marL="457200" lvl="0" indent="-342900" algn="l" rtl="0">
@@ -9179,10 +11052,10 @@
               <a:buChar char="-"/>
             </a:pPr>
             <a:r>
-              <a:rPr lang="en"/>
+              <a:rPr lang="en" dirty="0"/>
               <a:t>Report names should match how they are named in specification</a:t>
             </a:r>
-            <a:endParaRPr/>
+            <a:endParaRPr dirty="0"/>
           </a:p>
           <a:p>
             <a:pPr marL="457200" lvl="0" indent="-342900" algn="l" rtl="0">
@@ -9196,10 +11069,22 @@
               <a:buChar char="-"/>
             </a:pPr>
             <a:r>
-              <a:rPr lang="en"/>
+              <a:rPr lang="en" dirty="0"/>
               <a:t>Users allowed to view audit log within data warehouse UI will have special flag set on acct</a:t>
             </a:r>
-            <a:endParaRPr/>
+          </a:p>
+          <a:p>
+            <a:pPr marL="457200" lvl="0" indent="-342900" algn="l" rtl="0">
+              <a:spcBef>
+                <a:spcPts val="0"/>
+              </a:spcBef>
+              <a:spcAft>
+                <a:spcPts val="0"/>
+              </a:spcAft>
+              <a:buSzPts val="1800"/>
+              <a:buChar char="-"/>
+            </a:pPr>
+            <a:endParaRPr lang="en" dirty="0"/>
           </a:p>
         </p:txBody>
       </p:sp>
@@ -9212,6 +11097,189 @@
 </file>
 
 <file path=ppt/slides/slide5.xml><?xml version="1.0" encoding="utf-8"?>
+<p:sld xmlns:a="http://schemas.openxmlformats.org/drawingml/2006/main" xmlns:r="http://schemas.openxmlformats.org/officeDocument/2006/relationships" xmlns:p="http://schemas.openxmlformats.org/presentationml/2006/main">
+  <p:cSld>
+    <p:spTree>
+      <p:nvGrpSpPr>
+        <p:cNvPr id="1" name=""/>
+        <p:cNvGrpSpPr/>
+        <p:nvPr/>
+      </p:nvGrpSpPr>
+      <p:grpSpPr>
+        <a:xfrm>
+          <a:off x="0" y="0"/>
+          <a:ext cx="0" cy="0"/>
+          <a:chOff x="0" y="0"/>
+          <a:chExt cx="0" cy="0"/>
+        </a:xfrm>
+      </p:grpSpPr>
+      <p:sp>
+        <p:nvSpPr>
+          <p:cNvPr id="2" name="Title 1">
+            <a:extLst>
+              <a:ext uri="{FF2B5EF4-FFF2-40B4-BE49-F238E27FC236}">
+                <a16:creationId xmlns:a16="http://schemas.microsoft.com/office/drawing/2014/main" id="{721E7591-8938-9DA7-957A-3374CFD8AD1E}"/>
+              </a:ext>
+            </a:extLst>
+          </p:cNvPr>
+          <p:cNvSpPr>
+            <a:spLocks noGrp="1"/>
+          </p:cNvSpPr>
+          <p:nvPr>
+            <p:ph type="title"/>
+          </p:nvPr>
+        </p:nvSpPr>
+        <p:spPr>
+          <a:xfrm>
+            <a:off x="311700" y="250260"/>
+            <a:ext cx="8520600" cy="572700"/>
+          </a:xfrm>
+        </p:spPr>
+        <p:txBody>
+          <a:bodyPr>
+            <a:normAutofit fontScale="90000"/>
+          </a:bodyPr>
+          <a:lstStyle/>
+          <a:p>
+            <a:r>
+              <a:rPr lang="en-US" dirty="0"/>
+              <a:t>Report Restrictions</a:t>
+            </a:r>
+          </a:p>
+        </p:txBody>
+      </p:sp>
+      <p:sp>
+        <p:nvSpPr>
+          <p:cNvPr id="3" name="Text Placeholder 2">
+            <a:extLst>
+              <a:ext uri="{FF2B5EF4-FFF2-40B4-BE49-F238E27FC236}">
+                <a16:creationId xmlns:a16="http://schemas.microsoft.com/office/drawing/2014/main" id="{FFDECCEC-3F49-4D46-7324-DB0F1EFB6FFE}"/>
+              </a:ext>
+            </a:extLst>
+          </p:cNvPr>
+          <p:cNvSpPr>
+            <a:spLocks noGrp="1"/>
+          </p:cNvSpPr>
+          <p:nvPr>
+            <p:ph type="body" idx="1"/>
+          </p:nvPr>
+        </p:nvSpPr>
+        <p:spPr>
+          <a:xfrm>
+            <a:off x="311700" y="822960"/>
+            <a:ext cx="8520600" cy="4070280"/>
+          </a:xfrm>
+        </p:spPr>
+        <p:txBody>
+          <a:bodyPr>
+            <a:normAutofit lnSpcReduction="10000"/>
+          </a:bodyPr>
+          <a:lstStyle/>
+          <a:p>
+            <a:r>
+              <a:rPr lang="en-US" dirty="0"/>
+              <a:t>General report available to all users – return all data for all users</a:t>
+            </a:r>
+          </a:p>
+          <a:p>
+            <a:pPr lvl="1"/>
+            <a:r>
+              <a:rPr lang="en-US" dirty="0"/>
+              <a:t>Manufacturers product report </a:t>
+            </a:r>
+            <a:r>
+              <a:rPr lang="en-US" dirty="0">
+                <a:sym typeface="Wingdings" panose="05000000000000000000" pitchFamily="2" charset="2"/>
+              </a:rPr>
+              <a:t> manufacturers name, # products offered by manufacturer, avg and min and max retail price, product ID, name, and category</a:t>
+            </a:r>
+          </a:p>
+          <a:p>
+            <a:pPr lvl="1"/>
+            <a:r>
+              <a:rPr lang="en-US" dirty="0">
+                <a:sym typeface="Wingdings" panose="05000000000000000000" pitchFamily="2" charset="2"/>
+              </a:rPr>
+              <a:t>Category report  category name, number of products for each category, manufacturers offering products in that category, avg retail price of products in category</a:t>
+            </a:r>
+          </a:p>
+          <a:p>
+            <a:r>
+              <a:rPr lang="en-US" dirty="0">
+                <a:sym typeface="Wingdings" panose="05000000000000000000" pitchFamily="2" charset="2"/>
+              </a:rPr>
+              <a:t>District Reports – available to all users but more specific info regarding sales based on district of logged in user</a:t>
+            </a:r>
+          </a:p>
+          <a:p>
+            <a:pPr lvl="1"/>
+            <a:r>
+              <a:rPr lang="en-US" dirty="0">
+                <a:sym typeface="Wingdings" panose="05000000000000000000" pitchFamily="2" charset="2"/>
+              </a:rPr>
+              <a:t>Actual vs predicted revenue – revenue generated from sales vs predicted revenue if product never discounted</a:t>
+            </a:r>
+          </a:p>
+          <a:p>
+            <a:pPr lvl="1"/>
+            <a:r>
+              <a:rPr lang="en-US" dirty="0">
+                <a:sym typeface="Wingdings" panose="05000000000000000000" pitchFamily="2" charset="2"/>
+              </a:rPr>
+              <a:t>Air con on groundhog day – number of items sold in a year in air con category vs number of units sold on ground hog day</a:t>
+            </a:r>
+          </a:p>
+          <a:p>
+            <a:r>
+              <a:rPr lang="en-US" dirty="0">
+                <a:sym typeface="Wingdings" panose="05000000000000000000" pitchFamily="2" charset="2"/>
+              </a:rPr>
+              <a:t>Corporate reports – only available to users with access to all districts</a:t>
+            </a:r>
+          </a:p>
+          <a:p>
+            <a:pPr lvl="1"/>
+            <a:r>
+              <a:rPr lang="en-US" dirty="0">
+                <a:sym typeface="Wingdings" panose="05000000000000000000" pitchFamily="2" charset="2"/>
+              </a:rPr>
+              <a:t>Store revenue by year by state – revenue collected by store per state</a:t>
+            </a:r>
+          </a:p>
+          <a:p>
+            <a:pPr lvl="1"/>
+            <a:r>
+              <a:rPr lang="en-US" dirty="0">
+                <a:sym typeface="Wingdings" panose="05000000000000000000" pitchFamily="2" charset="2"/>
+              </a:rPr>
+              <a:t>District with highest volume for each category – units sold per district</a:t>
+            </a:r>
+          </a:p>
+          <a:p>
+            <a:pPr lvl="1"/>
+            <a:r>
+              <a:rPr lang="en-US" dirty="0">
+                <a:sym typeface="Wingdings" panose="05000000000000000000" pitchFamily="2" charset="2"/>
+              </a:rPr>
+              <a:t>Revenue by population – revenue for population categories</a:t>
+            </a:r>
+          </a:p>
+        </p:txBody>
+      </p:sp>
+    </p:spTree>
+    <p:extLst>
+      <p:ext uri="{BB962C8B-B14F-4D97-AF65-F5344CB8AC3E}">
+        <p14:creationId xmlns:p14="http://schemas.microsoft.com/office/powerpoint/2010/main" val="936884008"/>
+      </p:ext>
+    </p:extLst>
+  </p:cSld>
+  <p:clrMapOvr>
+    <a:masterClrMapping/>
+  </p:clrMapOvr>
+</p:sld>
+</file>
+
+<file path=ppt/slides/slide6.xml><?xml version="1.0" encoding="utf-8"?>
 <p:sld xmlns:a="http://schemas.openxmlformats.org/drawingml/2006/main" xmlns:r="http://schemas.openxmlformats.org/officeDocument/2006/relationships" xmlns:p="http://schemas.openxmlformats.org/presentationml/2006/main">
   <p:cSld>
     <p:spTree>
@@ -9314,7 +11382,7 @@
 </p:sld>
 </file>
 
-<file path=ppt/slides/slide6.xml><?xml version="1.0" encoding="utf-8"?>
+<file path=ppt/slides/slide7.xml><?xml version="1.0" encoding="utf-8"?>
 <p:sld xmlns:a="http://schemas.openxmlformats.org/drawingml/2006/main" xmlns:r="http://schemas.openxmlformats.org/officeDocument/2006/relationships" xmlns:p="http://schemas.openxmlformats.org/presentationml/2006/main">
   <p:cSld>
     <p:spTree>
@@ -9515,7 +11583,7 @@
 </p:sld>
 </file>
 
-<file path=ppt/slides/slide7.xml><?xml version="1.0" encoding="utf-8"?>
+<file path=ppt/slides/slide8.xml><?xml version="1.0" encoding="utf-8"?>
 <p:sld xmlns:a="http://schemas.openxmlformats.org/drawingml/2006/main" xmlns:r="http://schemas.openxmlformats.org/officeDocument/2006/relationships" xmlns:p="http://schemas.openxmlformats.org/presentationml/2006/main">
   <p:cSld>
     <p:spTree>
@@ -9852,7 +11920,7 @@
 </p:sld>
 </file>
 
-<file path=ppt/slides/slide8.xml><?xml version="1.0" encoding="utf-8"?>
+<file path=ppt/slides/slide9.xml><?xml version="1.0" encoding="utf-8"?>
 <p:sld xmlns:a="http://schemas.openxmlformats.org/drawingml/2006/main" xmlns:r="http://schemas.openxmlformats.org/officeDocument/2006/relationships" xmlns:p="http://schemas.openxmlformats.org/presentationml/2006/main">
   <p:cSld>
     <p:spTree>
@@ -11034,1878 +13102,6 @@
         </p:spPr>
       </p:cxnSp>
     </p:spTree>
-  </p:cSld>
-  <p:clrMapOvr>
-    <a:masterClrMapping/>
-  </p:clrMapOvr>
-</p:sld>
-</file>
-
-<file path=ppt/slides/slide9.xml><?xml version="1.0" encoding="utf-8"?>
-<p:sld xmlns:a="http://schemas.openxmlformats.org/drawingml/2006/main" xmlns:r="http://schemas.openxmlformats.org/officeDocument/2006/relationships" xmlns:p="http://schemas.openxmlformats.org/presentationml/2006/main">
-  <p:cSld>
-    <p:spTree>
-      <p:nvGrpSpPr>
-        <p:cNvPr id="1" name=""/>
-        <p:cNvGrpSpPr/>
-        <p:nvPr/>
-      </p:nvGrpSpPr>
-      <p:grpSpPr>
-        <a:xfrm>
-          <a:off x="0" y="0"/>
-          <a:ext cx="0" cy="0"/>
-          <a:chOff x="0" y="0"/>
-          <a:chExt cx="0" cy="0"/>
-        </a:xfrm>
-      </p:grpSpPr>
-      <p:sp>
-        <p:nvSpPr>
-          <p:cNvPr id="2" name="Title 1">
-            <a:extLst>
-              <a:ext uri="{FF2B5EF4-FFF2-40B4-BE49-F238E27FC236}">
-                <a16:creationId xmlns:a16="http://schemas.microsoft.com/office/drawing/2014/main" id="{CDF68962-8381-E4DF-D093-81216B28C06A}"/>
-              </a:ext>
-            </a:extLst>
-          </p:cNvPr>
-          <p:cNvSpPr>
-            <a:spLocks noGrp="1"/>
-          </p:cNvSpPr>
-          <p:nvPr>
-            <p:ph type="title"/>
-          </p:nvPr>
-        </p:nvSpPr>
-        <p:spPr>
-          <a:xfrm>
-            <a:off x="246730" y="0"/>
-            <a:ext cx="8520600" cy="246955"/>
-          </a:xfrm>
-        </p:spPr>
-        <p:txBody>
-          <a:bodyPr>
-            <a:normAutofit fontScale="90000"/>
-          </a:bodyPr>
-          <a:lstStyle/>
-          <a:p>
-            <a:r>
-              <a:rPr lang="en-US" sz="2000" dirty="0"/>
-              <a:t>Data Type and Formatting</a:t>
-            </a:r>
-          </a:p>
-        </p:txBody>
-      </p:sp>
-      <p:graphicFrame>
-        <p:nvGraphicFramePr>
-          <p:cNvPr id="4" name="Table 3">
-            <a:extLst>
-              <a:ext uri="{FF2B5EF4-FFF2-40B4-BE49-F238E27FC236}">
-                <a16:creationId xmlns:a16="http://schemas.microsoft.com/office/drawing/2014/main" id="{39085AC7-9D09-D178-9B5E-E4422F65A248}"/>
-              </a:ext>
-            </a:extLst>
-          </p:cNvPr>
-          <p:cNvGraphicFramePr>
-            <a:graphicFrameLocks noGrp="1"/>
-          </p:cNvGraphicFramePr>
-          <p:nvPr>
-            <p:extLst>
-              <p:ext uri="{D42A27DB-BD31-4B8C-83A1-F6EECF244321}">
-                <p14:modId xmlns:p14="http://schemas.microsoft.com/office/powerpoint/2010/main" val="4279333404"/>
-              </p:ext>
-            </p:extLst>
-          </p:nvPr>
-        </p:nvGraphicFramePr>
-        <p:xfrm>
-          <a:off x="296577" y="414923"/>
-          <a:ext cx="6958554" cy="4705917"/>
-        </p:xfrm>
-        <a:graphic>
-          <a:graphicData uri="http://schemas.openxmlformats.org/drawingml/2006/table">
-            <a:tbl>
-              <a:tblPr firstRow="1" bandRow="1">
-                <a:tableStyleId>{2E69291B-44AE-4880-B0DB-54CA540F50CF}</a:tableStyleId>
-              </a:tblPr>
-              <a:tblGrid>
-                <a:gridCol w="2319518">
-                  <a:extLst>
-                    <a:ext uri="{9D8B030D-6E8A-4147-A177-3AD203B41FA5}">
-                      <a16:colId xmlns:a16="http://schemas.microsoft.com/office/drawing/2014/main" val="832677790"/>
-                    </a:ext>
-                  </a:extLst>
-                </a:gridCol>
-                <a:gridCol w="2319518">
-                  <a:extLst>
-                    <a:ext uri="{9D8B030D-6E8A-4147-A177-3AD203B41FA5}">
-                      <a16:colId xmlns:a16="http://schemas.microsoft.com/office/drawing/2014/main" val="4174454364"/>
-                    </a:ext>
-                  </a:extLst>
-                </a:gridCol>
-                <a:gridCol w="2319518">
-                  <a:extLst>
-                    <a:ext uri="{9D8B030D-6E8A-4147-A177-3AD203B41FA5}">
-                      <a16:colId xmlns:a16="http://schemas.microsoft.com/office/drawing/2014/main" val="217317370"/>
-                    </a:ext>
-                  </a:extLst>
-                </a:gridCol>
-              </a:tblGrid>
-              <a:tr h="0">
-                <a:tc>
-                  <a:txBody>
-                    <a:bodyPr/>
-                    <a:lstStyle/>
-                    <a:p>
-                      <a:r>
-                        <a:rPr lang="en-US" sz="800" dirty="0"/>
-                        <a:t>Value</a:t>
-                      </a:r>
-                    </a:p>
-                  </a:txBody>
-                  <a:tcPr/>
-                </a:tc>
-                <a:tc>
-                  <a:txBody>
-                    <a:bodyPr/>
-                    <a:lstStyle/>
-                    <a:p>
-                      <a:r>
-                        <a:rPr lang="en-US" sz="800" dirty="0"/>
-                        <a:t>Type</a:t>
-                      </a:r>
-                    </a:p>
-                  </a:txBody>
-                  <a:tcPr/>
-                </a:tc>
-                <a:tc>
-                  <a:txBody>
-                    <a:bodyPr/>
-                    <a:lstStyle/>
-                    <a:p>
-                      <a:r>
-                        <a:rPr lang="en-US" sz="800" dirty="0"/>
-                        <a:t>Format</a:t>
-                      </a:r>
-                    </a:p>
-                  </a:txBody>
-                  <a:tcPr/>
-                </a:tc>
-                <a:extLst>
-                  <a:ext uri="{0D108BD9-81ED-4DB2-BD59-A6C34878D82A}">
-                    <a16:rowId xmlns:a16="http://schemas.microsoft.com/office/drawing/2014/main" val="3111753539"/>
-                  </a:ext>
-                </a:extLst>
-              </a:tr>
-              <a:tr h="176577">
-                <a:tc>
-                  <a:txBody>
-                    <a:bodyPr/>
-                    <a:lstStyle/>
-                    <a:p>
-                      <a:pPr marL="0" marR="0" lvl="0" indent="0" algn="l" defTabSz="914400" rtl="0" eaLnBrk="1" fontAlgn="auto" latinLnBrk="0" hangingPunct="1">
-                        <a:lnSpc>
-                          <a:spcPct val="100000"/>
-                        </a:lnSpc>
-                        <a:spcBef>
-                          <a:spcPts val="0"/>
-                        </a:spcBef>
-                        <a:spcAft>
-                          <a:spcPts val="0"/>
-                        </a:spcAft>
-                        <a:buClr>
-                          <a:srgbClr val="000000"/>
-                        </a:buClr>
-                        <a:buSzTx/>
-                        <a:buFont typeface="Arial"/>
-                        <a:buNone/>
-                        <a:tabLst/>
-                        <a:defRPr/>
-                      </a:pPr>
-                      <a:r>
-                        <a:rPr lang="en-US" sz="800" dirty="0"/>
-                        <a:t>Store Number</a:t>
-                      </a:r>
-                    </a:p>
-                  </a:txBody>
-                  <a:tcPr/>
-                </a:tc>
-                <a:tc>
-                  <a:txBody>
-                    <a:bodyPr/>
-                    <a:lstStyle/>
-                    <a:p>
-                      <a:r>
-                        <a:rPr lang="en-US" sz="800" dirty="0"/>
-                        <a:t>integer</a:t>
-                      </a:r>
-                    </a:p>
-                  </a:txBody>
-                  <a:tcPr/>
-                </a:tc>
-                <a:tc>
-                  <a:txBody>
-                    <a:bodyPr/>
-                    <a:lstStyle/>
-                    <a:p>
-                      <a:endParaRPr lang="en-US" sz="800"/>
-                    </a:p>
-                  </a:txBody>
-                  <a:tcPr/>
-                </a:tc>
-                <a:extLst>
-                  <a:ext uri="{0D108BD9-81ED-4DB2-BD59-A6C34878D82A}">
-                    <a16:rowId xmlns:a16="http://schemas.microsoft.com/office/drawing/2014/main" val="1972719646"/>
-                  </a:ext>
-                </a:extLst>
-              </a:tr>
-              <a:tr h="158482">
-                <a:tc>
-                  <a:txBody>
-                    <a:bodyPr/>
-                    <a:lstStyle/>
-                    <a:p>
-                      <a:pPr marL="0" marR="0" lvl="0" indent="0" algn="l" defTabSz="914400" rtl="0" eaLnBrk="1" fontAlgn="auto" latinLnBrk="0" hangingPunct="1">
-                        <a:lnSpc>
-                          <a:spcPct val="100000"/>
-                        </a:lnSpc>
-                        <a:spcBef>
-                          <a:spcPts val="0"/>
-                        </a:spcBef>
-                        <a:spcAft>
-                          <a:spcPts val="0"/>
-                        </a:spcAft>
-                        <a:buClr>
-                          <a:srgbClr val="000000"/>
-                        </a:buClr>
-                        <a:buSzTx/>
-                        <a:buFont typeface="Arial"/>
-                        <a:buNone/>
-                        <a:tabLst/>
-                        <a:defRPr/>
-                      </a:pPr>
-                      <a:r>
-                        <a:rPr lang="en-US" sz="800" dirty="0"/>
-                        <a:t>Store Phone number</a:t>
-                      </a:r>
-                    </a:p>
-                  </a:txBody>
-                  <a:tcPr/>
-                </a:tc>
-                <a:tc>
-                  <a:txBody>
-                    <a:bodyPr/>
-                    <a:lstStyle/>
-                    <a:p>
-                      <a:r>
-                        <a:rPr lang="en-US" sz="800" dirty="0"/>
-                        <a:t>string or integer </a:t>
-                      </a:r>
-                    </a:p>
-                  </a:txBody>
-                  <a:tcPr/>
-                </a:tc>
-                <a:tc>
-                  <a:txBody>
-                    <a:bodyPr/>
-                    <a:lstStyle/>
-                    <a:p>
-                      <a:pPr marL="0" marR="0" lvl="0" indent="0" algn="l" defTabSz="914400" rtl="0" eaLnBrk="1" fontAlgn="auto" latinLnBrk="0" hangingPunct="1">
-                        <a:lnSpc>
-                          <a:spcPct val="100000"/>
-                        </a:lnSpc>
-                        <a:spcBef>
-                          <a:spcPts val="0"/>
-                        </a:spcBef>
-                        <a:spcAft>
-                          <a:spcPts val="0"/>
-                        </a:spcAft>
-                        <a:buClr>
-                          <a:srgbClr val="000000"/>
-                        </a:buClr>
-                        <a:buSzTx/>
-                        <a:buFont typeface="Arial"/>
-                        <a:buNone/>
-                        <a:tabLst/>
-                        <a:defRPr/>
-                      </a:pPr>
-                      <a:r>
-                        <a:rPr lang="en-US" sz="800" dirty="0"/>
-                        <a:t>10 digit phone number,  (_ _ _)-_ _ _-_ _ _ _</a:t>
-                      </a:r>
-                    </a:p>
-                  </a:txBody>
-                  <a:tcPr/>
-                </a:tc>
-                <a:extLst>
-                  <a:ext uri="{0D108BD9-81ED-4DB2-BD59-A6C34878D82A}">
-                    <a16:rowId xmlns:a16="http://schemas.microsoft.com/office/drawing/2014/main" val="3005522037"/>
-                  </a:ext>
-                </a:extLst>
-              </a:tr>
-              <a:tr h="0">
-                <a:tc>
-                  <a:txBody>
-                    <a:bodyPr/>
-                    <a:lstStyle/>
-                    <a:p>
-                      <a:pPr marL="0" marR="0" lvl="0" indent="0" algn="l" defTabSz="914400" rtl="0" eaLnBrk="1" fontAlgn="auto" latinLnBrk="0" hangingPunct="1">
-                        <a:lnSpc>
-                          <a:spcPct val="100000"/>
-                        </a:lnSpc>
-                        <a:spcBef>
-                          <a:spcPts val="0"/>
-                        </a:spcBef>
-                        <a:spcAft>
-                          <a:spcPts val="0"/>
-                        </a:spcAft>
-                        <a:buClr>
-                          <a:srgbClr val="000000"/>
-                        </a:buClr>
-                        <a:buSzTx/>
-                        <a:buFont typeface="Arial"/>
-                        <a:buNone/>
-                        <a:tabLst/>
-                        <a:defRPr/>
-                      </a:pPr>
-                      <a:r>
-                        <a:rPr lang="en-US" sz="800" dirty="0"/>
-                        <a:t>Store district</a:t>
-                      </a:r>
-                    </a:p>
-                  </a:txBody>
-                  <a:tcPr/>
-                </a:tc>
-                <a:tc>
-                  <a:txBody>
-                    <a:bodyPr/>
-                    <a:lstStyle/>
-                    <a:p>
-                      <a:r>
-                        <a:rPr lang="en-US" sz="800" dirty="0"/>
-                        <a:t>String</a:t>
-                      </a:r>
-                    </a:p>
-                  </a:txBody>
-                  <a:tcPr/>
-                </a:tc>
-                <a:tc>
-                  <a:txBody>
-                    <a:bodyPr/>
-                    <a:lstStyle/>
-                    <a:p>
-                      <a:endParaRPr lang="en-US" sz="800" dirty="0"/>
-                    </a:p>
-                  </a:txBody>
-                  <a:tcPr/>
-                </a:tc>
-                <a:extLst>
-                  <a:ext uri="{0D108BD9-81ED-4DB2-BD59-A6C34878D82A}">
-                    <a16:rowId xmlns:a16="http://schemas.microsoft.com/office/drawing/2014/main" val="2963047820"/>
-                  </a:ext>
-                </a:extLst>
-              </a:tr>
-              <a:tr h="0">
-                <a:tc>
-                  <a:txBody>
-                    <a:bodyPr/>
-                    <a:lstStyle/>
-                    <a:p>
-                      <a:pPr marL="0" marR="0" lvl="0" indent="0" algn="l" defTabSz="914400" rtl="0" eaLnBrk="1" fontAlgn="auto" latinLnBrk="0" hangingPunct="1">
-                        <a:lnSpc>
-                          <a:spcPct val="100000"/>
-                        </a:lnSpc>
-                        <a:spcBef>
-                          <a:spcPts val="0"/>
-                        </a:spcBef>
-                        <a:spcAft>
-                          <a:spcPts val="0"/>
-                        </a:spcAft>
-                        <a:buClr>
-                          <a:srgbClr val="000000"/>
-                        </a:buClr>
-                        <a:buSzTx/>
-                        <a:buFont typeface="Arial"/>
-                        <a:buNone/>
-                        <a:tabLst/>
-                        <a:defRPr/>
-                      </a:pPr>
-                      <a:r>
-                        <a:rPr lang="en-US" sz="800" dirty="0"/>
-                        <a:t>District number </a:t>
-                      </a:r>
-                    </a:p>
-                  </a:txBody>
-                  <a:tcPr/>
-                </a:tc>
-                <a:tc>
-                  <a:txBody>
-                    <a:bodyPr/>
-                    <a:lstStyle/>
-                    <a:p>
-                      <a:pPr marL="0" marR="0" lvl="0" indent="0" algn="l" defTabSz="914400" rtl="0" eaLnBrk="1" fontAlgn="auto" latinLnBrk="0" hangingPunct="1">
-                        <a:lnSpc>
-                          <a:spcPct val="100000"/>
-                        </a:lnSpc>
-                        <a:spcBef>
-                          <a:spcPts val="0"/>
-                        </a:spcBef>
-                        <a:spcAft>
-                          <a:spcPts val="0"/>
-                        </a:spcAft>
-                        <a:buClr>
-                          <a:srgbClr val="000000"/>
-                        </a:buClr>
-                        <a:buSzTx/>
-                        <a:buFont typeface="Arial"/>
-                        <a:buNone/>
-                        <a:tabLst/>
-                        <a:defRPr/>
-                      </a:pPr>
-                      <a:r>
-                        <a:rPr lang="en-US" sz="800" dirty="0"/>
-                        <a:t>integer </a:t>
-                      </a:r>
-                    </a:p>
-                  </a:txBody>
-                  <a:tcPr/>
-                </a:tc>
-                <a:tc>
-                  <a:txBody>
-                    <a:bodyPr/>
-                    <a:lstStyle/>
-                    <a:p>
-                      <a:endParaRPr lang="en-US" sz="800"/>
-                    </a:p>
-                  </a:txBody>
-                  <a:tcPr/>
-                </a:tc>
-                <a:extLst>
-                  <a:ext uri="{0D108BD9-81ED-4DB2-BD59-A6C34878D82A}">
-                    <a16:rowId xmlns:a16="http://schemas.microsoft.com/office/drawing/2014/main" val="572236572"/>
-                  </a:ext>
-                </a:extLst>
-              </a:tr>
-              <a:tr h="0">
-                <a:tc>
-                  <a:txBody>
-                    <a:bodyPr/>
-                    <a:lstStyle/>
-                    <a:p>
-                      <a:pPr marL="0" marR="0" lvl="0" indent="0" algn="l" defTabSz="914400" rtl="0" eaLnBrk="1" fontAlgn="auto" latinLnBrk="0" hangingPunct="1">
-                        <a:lnSpc>
-                          <a:spcPct val="100000"/>
-                        </a:lnSpc>
-                        <a:spcBef>
-                          <a:spcPts val="0"/>
-                        </a:spcBef>
-                        <a:spcAft>
-                          <a:spcPts val="0"/>
-                        </a:spcAft>
-                        <a:buClr>
-                          <a:srgbClr val="000000"/>
-                        </a:buClr>
-                        <a:buSzTx/>
-                        <a:buFont typeface="Arial"/>
-                        <a:buNone/>
-                        <a:tabLst/>
-                        <a:defRPr/>
-                      </a:pPr>
-                      <a:r>
-                        <a:rPr lang="en-US" sz="800" dirty="0"/>
-                        <a:t>Store City</a:t>
-                      </a:r>
-                    </a:p>
-                  </a:txBody>
-                  <a:tcPr/>
-                </a:tc>
-                <a:tc>
-                  <a:txBody>
-                    <a:bodyPr/>
-                    <a:lstStyle/>
-                    <a:p>
-                      <a:r>
-                        <a:rPr lang="en-US" sz="800" dirty="0"/>
-                        <a:t>String</a:t>
-                      </a:r>
-                    </a:p>
-                  </a:txBody>
-                  <a:tcPr/>
-                </a:tc>
-                <a:tc>
-                  <a:txBody>
-                    <a:bodyPr/>
-                    <a:lstStyle/>
-                    <a:p>
-                      <a:endParaRPr lang="en-US" sz="800"/>
-                    </a:p>
-                  </a:txBody>
-                  <a:tcPr/>
-                </a:tc>
-                <a:extLst>
-                  <a:ext uri="{0D108BD9-81ED-4DB2-BD59-A6C34878D82A}">
-                    <a16:rowId xmlns:a16="http://schemas.microsoft.com/office/drawing/2014/main" val="651649283"/>
-                  </a:ext>
-                </a:extLst>
-              </a:tr>
-              <a:tr h="0">
-                <a:tc>
-                  <a:txBody>
-                    <a:bodyPr/>
-                    <a:lstStyle/>
-                    <a:p>
-                      <a:pPr marL="0" marR="0" lvl="0" indent="0" algn="l" defTabSz="914400" rtl="0" eaLnBrk="1" fontAlgn="auto" latinLnBrk="0" hangingPunct="1">
-                        <a:lnSpc>
-                          <a:spcPct val="100000"/>
-                        </a:lnSpc>
-                        <a:spcBef>
-                          <a:spcPts val="0"/>
-                        </a:spcBef>
-                        <a:spcAft>
-                          <a:spcPts val="0"/>
-                        </a:spcAft>
-                        <a:buClr>
-                          <a:srgbClr val="000000"/>
-                        </a:buClr>
-                        <a:buSzTx/>
-                        <a:buFont typeface="Arial"/>
-                        <a:buNone/>
-                        <a:tabLst/>
-                        <a:defRPr/>
-                      </a:pPr>
-                      <a:r>
-                        <a:rPr lang="en-US" sz="800" dirty="0"/>
-                        <a:t>State</a:t>
-                      </a:r>
-                    </a:p>
-                  </a:txBody>
-                  <a:tcPr/>
-                </a:tc>
-                <a:tc>
-                  <a:txBody>
-                    <a:bodyPr/>
-                    <a:lstStyle/>
-                    <a:p>
-                      <a:r>
-                        <a:rPr lang="en-US" sz="800" dirty="0"/>
-                        <a:t>String</a:t>
-                      </a:r>
-                    </a:p>
-                  </a:txBody>
-                  <a:tcPr/>
-                </a:tc>
-                <a:tc>
-                  <a:txBody>
-                    <a:bodyPr/>
-                    <a:lstStyle/>
-                    <a:p>
-                      <a:pPr marL="0" marR="0" lvl="0" indent="0" algn="l" defTabSz="914400" rtl="0" eaLnBrk="1" fontAlgn="auto" latinLnBrk="0" hangingPunct="1">
-                        <a:lnSpc>
-                          <a:spcPct val="100000"/>
-                        </a:lnSpc>
-                        <a:spcBef>
-                          <a:spcPts val="0"/>
-                        </a:spcBef>
-                        <a:spcAft>
-                          <a:spcPts val="0"/>
-                        </a:spcAft>
-                        <a:buClr>
-                          <a:srgbClr val="000000"/>
-                        </a:buClr>
-                        <a:buSzTx/>
-                        <a:buFont typeface="Arial"/>
-                        <a:buNone/>
-                        <a:tabLst/>
-                        <a:defRPr/>
-                      </a:pPr>
-                      <a:r>
-                        <a:rPr lang="en-US" sz="800" dirty="0"/>
-                        <a:t>2 letter abbreviation, ex. TX</a:t>
-                      </a:r>
-                    </a:p>
-                  </a:txBody>
-                  <a:tcPr/>
-                </a:tc>
-                <a:extLst>
-                  <a:ext uri="{0D108BD9-81ED-4DB2-BD59-A6C34878D82A}">
-                    <a16:rowId xmlns:a16="http://schemas.microsoft.com/office/drawing/2014/main" val="1576900529"/>
-                  </a:ext>
-                </a:extLst>
-              </a:tr>
-              <a:tr h="202830">
-                <a:tc>
-                  <a:txBody>
-                    <a:bodyPr/>
-                    <a:lstStyle/>
-                    <a:p>
-                      <a:pPr marL="0" marR="0" lvl="0" indent="0" algn="l" defTabSz="914400" rtl="0" eaLnBrk="1" fontAlgn="auto" latinLnBrk="0" hangingPunct="1">
-                        <a:lnSpc>
-                          <a:spcPct val="100000"/>
-                        </a:lnSpc>
-                        <a:spcBef>
-                          <a:spcPts val="0"/>
-                        </a:spcBef>
-                        <a:spcAft>
-                          <a:spcPts val="0"/>
-                        </a:spcAft>
-                        <a:buClr>
-                          <a:srgbClr val="000000"/>
-                        </a:buClr>
-                        <a:buSzTx/>
-                        <a:buFont typeface="Arial"/>
-                        <a:buNone/>
-                        <a:tabLst/>
-                        <a:defRPr/>
-                      </a:pPr>
-                      <a:r>
-                        <a:rPr lang="en-US" sz="800" dirty="0"/>
-                        <a:t>Product PID </a:t>
-                      </a:r>
-                    </a:p>
-                  </a:txBody>
-                  <a:tcPr/>
-                </a:tc>
-                <a:tc>
-                  <a:txBody>
-                    <a:bodyPr/>
-                    <a:lstStyle/>
-                    <a:p>
-                      <a:pPr marL="0" marR="0" lvl="0" indent="0" algn="l" defTabSz="914400" rtl="0" eaLnBrk="1" fontAlgn="auto" latinLnBrk="0" hangingPunct="1">
-                        <a:lnSpc>
-                          <a:spcPct val="100000"/>
-                        </a:lnSpc>
-                        <a:spcBef>
-                          <a:spcPts val="0"/>
-                        </a:spcBef>
-                        <a:spcAft>
-                          <a:spcPts val="0"/>
-                        </a:spcAft>
-                        <a:buClr>
-                          <a:srgbClr val="000000"/>
-                        </a:buClr>
-                        <a:buSzTx/>
-                        <a:buFont typeface="Arial"/>
-                        <a:buNone/>
-                        <a:tabLst/>
-                        <a:defRPr/>
-                      </a:pPr>
-                      <a:r>
-                        <a:rPr lang="en-US" sz="800" dirty="0"/>
-                        <a:t>(probably integer)</a:t>
-                      </a:r>
-                    </a:p>
-                  </a:txBody>
-                  <a:tcPr/>
-                </a:tc>
-                <a:tc>
-                  <a:txBody>
-                    <a:bodyPr/>
-                    <a:lstStyle/>
-                    <a:p>
-                      <a:endParaRPr lang="en-US" sz="800" dirty="0"/>
-                    </a:p>
-                  </a:txBody>
-                  <a:tcPr/>
-                </a:tc>
-                <a:extLst>
-                  <a:ext uri="{0D108BD9-81ED-4DB2-BD59-A6C34878D82A}">
-                    <a16:rowId xmlns:a16="http://schemas.microsoft.com/office/drawing/2014/main" val="1401638539"/>
-                  </a:ext>
-                </a:extLst>
-              </a:tr>
-              <a:tr h="213583">
-                <a:tc>
-                  <a:txBody>
-                    <a:bodyPr/>
-                    <a:lstStyle/>
-                    <a:p>
-                      <a:pPr marL="0" marR="0" lvl="0" indent="0" algn="l" defTabSz="914400" rtl="0" eaLnBrk="1" fontAlgn="auto" latinLnBrk="0" hangingPunct="1">
-                        <a:lnSpc>
-                          <a:spcPct val="100000"/>
-                        </a:lnSpc>
-                        <a:spcBef>
-                          <a:spcPts val="0"/>
-                        </a:spcBef>
-                        <a:spcAft>
-                          <a:spcPts val="0"/>
-                        </a:spcAft>
-                        <a:buClr>
-                          <a:srgbClr val="000000"/>
-                        </a:buClr>
-                        <a:buSzTx/>
-                        <a:buFont typeface="Arial"/>
-                        <a:buNone/>
-                        <a:tabLst/>
-                        <a:defRPr/>
-                      </a:pPr>
-                      <a:r>
-                        <a:rPr lang="en-US" sz="800" dirty="0"/>
-                        <a:t>Product name</a:t>
-                      </a:r>
-                    </a:p>
-                  </a:txBody>
-                  <a:tcPr/>
-                </a:tc>
-                <a:tc>
-                  <a:txBody>
-                    <a:bodyPr/>
-                    <a:lstStyle/>
-                    <a:p>
-                      <a:pPr marL="0" marR="0" lvl="0" indent="0" algn="l" defTabSz="914400" rtl="0" eaLnBrk="1" fontAlgn="auto" latinLnBrk="0" hangingPunct="1">
-                        <a:lnSpc>
-                          <a:spcPct val="100000"/>
-                        </a:lnSpc>
-                        <a:spcBef>
-                          <a:spcPts val="0"/>
-                        </a:spcBef>
-                        <a:spcAft>
-                          <a:spcPts val="0"/>
-                        </a:spcAft>
-                        <a:buClr>
-                          <a:srgbClr val="000000"/>
-                        </a:buClr>
-                        <a:buSzTx/>
-                        <a:buFont typeface="Arial"/>
-                        <a:buNone/>
-                        <a:tabLst/>
-                        <a:defRPr/>
-                      </a:pPr>
-                      <a:r>
-                        <a:rPr lang="en-US" sz="800" dirty="0"/>
-                        <a:t>string</a:t>
-                      </a:r>
-                    </a:p>
-                  </a:txBody>
-                  <a:tcPr/>
-                </a:tc>
-                <a:tc>
-                  <a:txBody>
-                    <a:bodyPr/>
-                    <a:lstStyle/>
-                    <a:p>
-                      <a:endParaRPr lang="en-US" sz="800" dirty="0"/>
-                    </a:p>
-                  </a:txBody>
-                  <a:tcPr/>
-                </a:tc>
-                <a:extLst>
-                  <a:ext uri="{0D108BD9-81ED-4DB2-BD59-A6C34878D82A}">
-                    <a16:rowId xmlns:a16="http://schemas.microsoft.com/office/drawing/2014/main" val="855919533"/>
-                  </a:ext>
-                </a:extLst>
-              </a:tr>
-              <a:tr h="139943">
-                <a:tc>
-                  <a:txBody>
-                    <a:bodyPr/>
-                    <a:lstStyle/>
-                    <a:p>
-                      <a:pPr marL="0" marR="0" lvl="0" indent="0" algn="l" defTabSz="914400" rtl="0" eaLnBrk="1" fontAlgn="auto" latinLnBrk="0" hangingPunct="1">
-                        <a:lnSpc>
-                          <a:spcPct val="100000"/>
-                        </a:lnSpc>
-                        <a:spcBef>
-                          <a:spcPts val="0"/>
-                        </a:spcBef>
-                        <a:spcAft>
-                          <a:spcPts val="0"/>
-                        </a:spcAft>
-                        <a:buClr>
-                          <a:srgbClr val="000000"/>
-                        </a:buClr>
-                        <a:buSzTx/>
-                        <a:buFont typeface="Arial"/>
-                        <a:buNone/>
-                        <a:tabLst/>
-                        <a:defRPr/>
-                      </a:pPr>
-                      <a:r>
-                        <a:rPr lang="en-US" sz="800" dirty="0"/>
-                        <a:t>Manufacturer name</a:t>
-                      </a:r>
-                    </a:p>
-                  </a:txBody>
-                  <a:tcPr/>
-                </a:tc>
-                <a:tc>
-                  <a:txBody>
-                    <a:bodyPr/>
-                    <a:lstStyle/>
-                    <a:p>
-                      <a:pPr marL="0" marR="0" lvl="0" indent="0" algn="l" defTabSz="914400" rtl="0" eaLnBrk="1" fontAlgn="auto" latinLnBrk="0" hangingPunct="1">
-                        <a:lnSpc>
-                          <a:spcPct val="100000"/>
-                        </a:lnSpc>
-                        <a:spcBef>
-                          <a:spcPts val="0"/>
-                        </a:spcBef>
-                        <a:spcAft>
-                          <a:spcPts val="0"/>
-                        </a:spcAft>
-                        <a:buClr>
-                          <a:srgbClr val="000000"/>
-                        </a:buClr>
-                        <a:buSzTx/>
-                        <a:buFont typeface="Arial"/>
-                        <a:buNone/>
-                        <a:tabLst/>
-                        <a:defRPr/>
-                      </a:pPr>
-                      <a:r>
-                        <a:rPr lang="en-US" sz="800" dirty="0"/>
-                        <a:t>string </a:t>
-                      </a:r>
-                    </a:p>
-                  </a:txBody>
-                  <a:tcPr/>
-                </a:tc>
-                <a:tc>
-                  <a:txBody>
-                    <a:bodyPr/>
-                    <a:lstStyle/>
-                    <a:p>
-                      <a:endParaRPr lang="en-US" sz="800" dirty="0"/>
-                    </a:p>
-                  </a:txBody>
-                  <a:tcPr/>
-                </a:tc>
-                <a:extLst>
-                  <a:ext uri="{0D108BD9-81ED-4DB2-BD59-A6C34878D82A}">
-                    <a16:rowId xmlns:a16="http://schemas.microsoft.com/office/drawing/2014/main" val="2377927883"/>
-                  </a:ext>
-                </a:extLst>
-              </a:tr>
-              <a:tr h="225134">
-                <a:tc>
-                  <a:txBody>
-                    <a:bodyPr/>
-                    <a:lstStyle/>
-                    <a:p>
-                      <a:pPr marL="0" marR="0" lvl="0" indent="0" algn="l" defTabSz="914400" rtl="0" eaLnBrk="1" fontAlgn="auto" latinLnBrk="0" hangingPunct="1">
-                        <a:lnSpc>
-                          <a:spcPct val="100000"/>
-                        </a:lnSpc>
-                        <a:spcBef>
-                          <a:spcPts val="0"/>
-                        </a:spcBef>
-                        <a:spcAft>
-                          <a:spcPts val="0"/>
-                        </a:spcAft>
-                        <a:buClr>
-                          <a:srgbClr val="000000"/>
-                        </a:buClr>
-                        <a:buSzTx/>
-                        <a:buFont typeface="Arial"/>
-                        <a:buNone/>
-                        <a:tabLst/>
-                        <a:defRPr/>
-                      </a:pPr>
-                      <a:r>
-                        <a:rPr lang="en-US" sz="800" dirty="0"/>
-                        <a:t>Product category </a:t>
-                      </a:r>
-                    </a:p>
-                  </a:txBody>
-                  <a:tcPr/>
-                </a:tc>
-                <a:tc>
-                  <a:txBody>
-                    <a:bodyPr/>
-                    <a:lstStyle/>
-                    <a:p>
-                      <a:pPr marL="0" marR="0" lvl="0" indent="0" algn="l" defTabSz="914400" rtl="0" eaLnBrk="1" fontAlgn="auto" latinLnBrk="0" hangingPunct="1">
-                        <a:lnSpc>
-                          <a:spcPct val="100000"/>
-                        </a:lnSpc>
-                        <a:spcBef>
-                          <a:spcPts val="0"/>
-                        </a:spcBef>
-                        <a:spcAft>
-                          <a:spcPts val="0"/>
-                        </a:spcAft>
-                        <a:buClr>
-                          <a:srgbClr val="000000"/>
-                        </a:buClr>
-                        <a:buSzTx/>
-                        <a:buFont typeface="Arial"/>
-                        <a:buNone/>
-                        <a:tabLst/>
-                        <a:defRPr/>
-                      </a:pPr>
-                      <a:r>
-                        <a:rPr lang="en-US" sz="800" dirty="0"/>
-                        <a:t>string </a:t>
-                      </a:r>
-                    </a:p>
-                  </a:txBody>
-                  <a:tcPr/>
-                </a:tc>
-                <a:tc>
-                  <a:txBody>
-                    <a:bodyPr/>
-                    <a:lstStyle/>
-                    <a:p>
-                      <a:endParaRPr lang="en-US" sz="800" dirty="0"/>
-                    </a:p>
-                  </a:txBody>
-                  <a:tcPr/>
-                </a:tc>
-                <a:extLst>
-                  <a:ext uri="{0D108BD9-81ED-4DB2-BD59-A6C34878D82A}">
-                    <a16:rowId xmlns:a16="http://schemas.microsoft.com/office/drawing/2014/main" val="3892633442"/>
-                  </a:ext>
-                </a:extLst>
-              </a:tr>
-              <a:tr h="0">
-                <a:tc>
-                  <a:txBody>
-                    <a:bodyPr/>
-                    <a:lstStyle/>
-                    <a:p>
-                      <a:pPr marL="0" marR="0" lvl="0" indent="0" algn="l" defTabSz="914400" rtl="0" eaLnBrk="1" fontAlgn="auto" latinLnBrk="0" hangingPunct="1">
-                        <a:lnSpc>
-                          <a:spcPct val="100000"/>
-                        </a:lnSpc>
-                        <a:spcBef>
-                          <a:spcPts val="0"/>
-                        </a:spcBef>
-                        <a:spcAft>
-                          <a:spcPts val="0"/>
-                        </a:spcAft>
-                        <a:buClr>
-                          <a:srgbClr val="000000"/>
-                        </a:buClr>
-                        <a:buSzTx/>
-                        <a:buFont typeface="Arial"/>
-                        <a:buNone/>
-                        <a:tabLst/>
-                        <a:defRPr/>
-                      </a:pPr>
-                      <a:r>
-                        <a:rPr lang="en-US" sz="800" dirty="0"/>
-                        <a:t>Retail price</a:t>
-                      </a:r>
-                    </a:p>
-                  </a:txBody>
-                  <a:tcPr/>
-                </a:tc>
-                <a:tc>
-                  <a:txBody>
-                    <a:bodyPr/>
-                    <a:lstStyle/>
-                    <a:p>
-                      <a:pPr marL="0" marR="0" lvl="0" indent="0" algn="l" defTabSz="914400" rtl="0" eaLnBrk="1" fontAlgn="auto" latinLnBrk="0" hangingPunct="1">
-                        <a:lnSpc>
-                          <a:spcPct val="100000"/>
-                        </a:lnSpc>
-                        <a:spcBef>
-                          <a:spcPts val="0"/>
-                        </a:spcBef>
-                        <a:spcAft>
-                          <a:spcPts val="0"/>
-                        </a:spcAft>
-                        <a:buClr>
-                          <a:srgbClr val="000000"/>
-                        </a:buClr>
-                        <a:buSzTx/>
-                        <a:buFont typeface="Arial"/>
-                        <a:buNone/>
-                        <a:tabLst/>
-                        <a:defRPr/>
-                      </a:pPr>
-                      <a:r>
-                        <a:rPr lang="en-US" sz="800" dirty="0"/>
-                        <a:t>Float</a:t>
-                      </a:r>
-                    </a:p>
-                  </a:txBody>
-                  <a:tcPr/>
-                </a:tc>
-                <a:tc>
-                  <a:txBody>
-                    <a:bodyPr/>
-                    <a:lstStyle/>
-                    <a:p>
-                      <a:pPr marL="0" marR="0" lvl="0" indent="0" algn="l" defTabSz="914400" rtl="0" eaLnBrk="1" fontAlgn="auto" latinLnBrk="0" hangingPunct="1">
-                        <a:lnSpc>
-                          <a:spcPct val="100000"/>
-                        </a:lnSpc>
-                        <a:spcBef>
-                          <a:spcPts val="0"/>
-                        </a:spcBef>
-                        <a:spcAft>
-                          <a:spcPts val="0"/>
-                        </a:spcAft>
-                        <a:buClr>
-                          <a:srgbClr val="000000"/>
-                        </a:buClr>
-                        <a:buSzTx/>
-                        <a:buFont typeface="Arial"/>
-                        <a:buNone/>
-                        <a:tabLst/>
-                        <a:defRPr/>
-                      </a:pPr>
-                      <a:r>
-                        <a:rPr lang="en-US" sz="800" dirty="0"/>
-                        <a:t>2 decimal places</a:t>
-                      </a:r>
-                    </a:p>
-                  </a:txBody>
-                  <a:tcPr/>
-                </a:tc>
-                <a:extLst>
-                  <a:ext uri="{0D108BD9-81ED-4DB2-BD59-A6C34878D82A}">
-                    <a16:rowId xmlns:a16="http://schemas.microsoft.com/office/drawing/2014/main" val="3733738910"/>
-                  </a:ext>
-                </a:extLst>
-              </a:tr>
-              <a:tr h="0">
-                <a:tc>
-                  <a:txBody>
-                    <a:bodyPr/>
-                    <a:lstStyle/>
-                    <a:p>
-                      <a:pPr marL="0" marR="0" lvl="0" indent="0" algn="l" defTabSz="914400" rtl="0" eaLnBrk="1" fontAlgn="auto" latinLnBrk="0" hangingPunct="1">
-                        <a:lnSpc>
-                          <a:spcPct val="100000"/>
-                        </a:lnSpc>
-                        <a:spcBef>
-                          <a:spcPts val="0"/>
-                        </a:spcBef>
-                        <a:spcAft>
-                          <a:spcPts val="0"/>
-                        </a:spcAft>
-                        <a:buClr>
-                          <a:srgbClr val="000000"/>
-                        </a:buClr>
-                        <a:buSzTx/>
-                        <a:buFont typeface="Arial"/>
-                        <a:buNone/>
-                        <a:tabLst/>
-                        <a:defRPr/>
-                      </a:pPr>
-                      <a:r>
-                        <a:rPr lang="en-US" sz="800" dirty="0"/>
-                        <a:t>Discount date</a:t>
-                      </a:r>
-                    </a:p>
-                  </a:txBody>
-                  <a:tcPr/>
-                </a:tc>
-                <a:tc>
-                  <a:txBody>
-                    <a:bodyPr/>
-                    <a:lstStyle/>
-                    <a:p>
-                      <a:pPr marL="0" marR="0" lvl="0" indent="0" algn="l" defTabSz="914400" rtl="0" eaLnBrk="1" fontAlgn="auto" latinLnBrk="0" hangingPunct="1">
-                        <a:lnSpc>
-                          <a:spcPct val="100000"/>
-                        </a:lnSpc>
-                        <a:spcBef>
-                          <a:spcPts val="0"/>
-                        </a:spcBef>
-                        <a:spcAft>
-                          <a:spcPts val="0"/>
-                        </a:spcAft>
-                        <a:buClr>
-                          <a:srgbClr val="000000"/>
-                        </a:buClr>
-                        <a:buSzTx/>
-                        <a:buFont typeface="Arial"/>
-                        <a:buNone/>
-                        <a:tabLst/>
-                        <a:defRPr/>
-                      </a:pPr>
-                      <a:endParaRPr lang="en-US" sz="800" dirty="0"/>
-                    </a:p>
-                  </a:txBody>
-                  <a:tcPr/>
-                </a:tc>
-                <a:tc>
-                  <a:txBody>
-                    <a:bodyPr/>
-                    <a:lstStyle/>
-                    <a:p>
-                      <a:r>
-                        <a:rPr lang="en-US" sz="800" dirty="0"/>
-                        <a:t>mm-dd-</a:t>
-                      </a:r>
-                      <a:r>
-                        <a:rPr lang="en-US" sz="800" dirty="0" err="1"/>
-                        <a:t>yyyy</a:t>
-                      </a:r>
-                      <a:endParaRPr lang="en-US" sz="800" dirty="0"/>
-                    </a:p>
-                  </a:txBody>
-                  <a:tcPr/>
-                </a:tc>
-                <a:extLst>
-                  <a:ext uri="{0D108BD9-81ED-4DB2-BD59-A6C34878D82A}">
-                    <a16:rowId xmlns:a16="http://schemas.microsoft.com/office/drawing/2014/main" val="739670954"/>
-                  </a:ext>
-                </a:extLst>
-              </a:tr>
-              <a:tr h="0">
-                <a:tc>
-                  <a:txBody>
-                    <a:bodyPr/>
-                    <a:lstStyle/>
-                    <a:p>
-                      <a:pPr marL="0" marR="0" lvl="0" indent="0" algn="l" defTabSz="914400" rtl="0" eaLnBrk="1" fontAlgn="auto" latinLnBrk="0" hangingPunct="1">
-                        <a:lnSpc>
-                          <a:spcPct val="100000"/>
-                        </a:lnSpc>
-                        <a:spcBef>
-                          <a:spcPts val="0"/>
-                        </a:spcBef>
-                        <a:spcAft>
-                          <a:spcPts val="0"/>
-                        </a:spcAft>
-                        <a:buClr>
-                          <a:srgbClr val="000000"/>
-                        </a:buClr>
-                        <a:buSzTx/>
-                        <a:buFont typeface="Arial"/>
-                        <a:buNone/>
-                        <a:tabLst/>
-                        <a:defRPr/>
-                      </a:pPr>
-                      <a:r>
-                        <a:rPr lang="en-US" sz="800" dirty="0"/>
-                        <a:t>Discount price</a:t>
-                      </a:r>
-                    </a:p>
-                  </a:txBody>
-                  <a:tcPr/>
-                </a:tc>
-                <a:tc>
-                  <a:txBody>
-                    <a:bodyPr/>
-                    <a:lstStyle/>
-                    <a:p>
-                      <a:pPr marL="0" marR="0" lvl="0" indent="0" algn="l" defTabSz="914400" rtl="0" eaLnBrk="1" fontAlgn="auto" latinLnBrk="0" hangingPunct="1">
-                        <a:lnSpc>
-                          <a:spcPct val="100000"/>
-                        </a:lnSpc>
-                        <a:spcBef>
-                          <a:spcPts val="0"/>
-                        </a:spcBef>
-                        <a:spcAft>
-                          <a:spcPts val="0"/>
-                        </a:spcAft>
-                        <a:buClr>
-                          <a:srgbClr val="000000"/>
-                        </a:buClr>
-                        <a:buSzTx/>
-                        <a:buFont typeface="Arial"/>
-                        <a:buNone/>
-                        <a:tabLst/>
-                        <a:defRPr/>
-                      </a:pPr>
-                      <a:r>
-                        <a:rPr lang="en-US" sz="800" dirty="0"/>
-                        <a:t>Float</a:t>
-                      </a:r>
-                    </a:p>
-                  </a:txBody>
-                  <a:tcPr/>
-                </a:tc>
-                <a:tc>
-                  <a:txBody>
-                    <a:bodyPr/>
-                    <a:lstStyle/>
-                    <a:p>
-                      <a:pPr marL="0" marR="0" lvl="0" indent="0" algn="l" defTabSz="914400" rtl="0" eaLnBrk="1" fontAlgn="auto" latinLnBrk="0" hangingPunct="1">
-                        <a:lnSpc>
-                          <a:spcPct val="100000"/>
-                        </a:lnSpc>
-                        <a:spcBef>
-                          <a:spcPts val="0"/>
-                        </a:spcBef>
-                        <a:spcAft>
-                          <a:spcPts val="0"/>
-                        </a:spcAft>
-                        <a:buClr>
-                          <a:srgbClr val="000000"/>
-                        </a:buClr>
-                        <a:buSzTx/>
-                        <a:buFont typeface="Arial"/>
-                        <a:buNone/>
-                        <a:tabLst/>
-                        <a:defRPr/>
-                      </a:pPr>
-                      <a:r>
-                        <a:rPr lang="en-US" sz="800" dirty="0"/>
-                        <a:t>2 decimal places</a:t>
-                      </a:r>
-                    </a:p>
-                  </a:txBody>
-                  <a:tcPr/>
-                </a:tc>
-                <a:extLst>
-                  <a:ext uri="{0D108BD9-81ED-4DB2-BD59-A6C34878D82A}">
-                    <a16:rowId xmlns:a16="http://schemas.microsoft.com/office/drawing/2014/main" val="1642785460"/>
-                  </a:ext>
-                </a:extLst>
-              </a:tr>
-              <a:tr h="0">
-                <a:tc>
-                  <a:txBody>
-                    <a:bodyPr/>
-                    <a:lstStyle/>
-                    <a:p>
-                      <a:pPr marL="0" marR="0" lvl="0" indent="0" algn="l" defTabSz="914400" rtl="0" eaLnBrk="1" fontAlgn="auto" latinLnBrk="0" hangingPunct="1">
-                        <a:lnSpc>
-                          <a:spcPct val="100000"/>
-                        </a:lnSpc>
-                        <a:spcBef>
-                          <a:spcPts val="0"/>
-                        </a:spcBef>
-                        <a:spcAft>
-                          <a:spcPts val="0"/>
-                        </a:spcAft>
-                        <a:buClr>
-                          <a:srgbClr val="000000"/>
-                        </a:buClr>
-                        <a:buSzTx/>
-                        <a:buFont typeface="Arial"/>
-                        <a:buNone/>
-                        <a:tabLst/>
-                        <a:defRPr/>
-                      </a:pPr>
-                      <a:r>
-                        <a:rPr lang="en-US" sz="800" dirty="0"/>
-                        <a:t>Holiday name</a:t>
-                      </a:r>
-                    </a:p>
-                  </a:txBody>
-                  <a:tcPr/>
-                </a:tc>
-                <a:tc>
-                  <a:txBody>
-                    <a:bodyPr/>
-                    <a:lstStyle/>
-                    <a:p>
-                      <a:pPr marL="0" marR="0" lvl="0" indent="0" algn="l" defTabSz="914400" rtl="0" eaLnBrk="1" fontAlgn="auto" latinLnBrk="0" hangingPunct="1">
-                        <a:lnSpc>
-                          <a:spcPct val="100000"/>
-                        </a:lnSpc>
-                        <a:spcBef>
-                          <a:spcPts val="0"/>
-                        </a:spcBef>
-                        <a:spcAft>
-                          <a:spcPts val="0"/>
-                        </a:spcAft>
-                        <a:buClr>
-                          <a:srgbClr val="000000"/>
-                        </a:buClr>
-                        <a:buSzTx/>
-                        <a:buFont typeface="Arial"/>
-                        <a:buNone/>
-                        <a:tabLst/>
-                        <a:defRPr/>
-                      </a:pPr>
-                      <a:r>
-                        <a:rPr lang="en-US" sz="800" dirty="0"/>
-                        <a:t>String</a:t>
-                      </a:r>
-                    </a:p>
-                  </a:txBody>
-                  <a:tcPr/>
-                </a:tc>
-                <a:tc>
-                  <a:txBody>
-                    <a:bodyPr/>
-                    <a:lstStyle/>
-                    <a:p>
-                      <a:endParaRPr lang="en-US" sz="800" dirty="0"/>
-                    </a:p>
-                  </a:txBody>
-                  <a:tcPr/>
-                </a:tc>
-                <a:extLst>
-                  <a:ext uri="{0D108BD9-81ED-4DB2-BD59-A6C34878D82A}">
-                    <a16:rowId xmlns:a16="http://schemas.microsoft.com/office/drawing/2014/main" val="3438467564"/>
-                  </a:ext>
-                </a:extLst>
-              </a:tr>
-              <a:tr h="0">
-                <a:tc>
-                  <a:txBody>
-                    <a:bodyPr/>
-                    <a:lstStyle/>
-                    <a:p>
-                      <a:pPr marL="0" marR="0" lvl="0" indent="0" algn="l" defTabSz="914400" rtl="0" eaLnBrk="1" fontAlgn="auto" latinLnBrk="0" hangingPunct="1">
-                        <a:lnSpc>
-                          <a:spcPct val="100000"/>
-                        </a:lnSpc>
-                        <a:spcBef>
-                          <a:spcPts val="0"/>
-                        </a:spcBef>
-                        <a:spcAft>
-                          <a:spcPts val="0"/>
-                        </a:spcAft>
-                        <a:buClr>
-                          <a:srgbClr val="000000"/>
-                        </a:buClr>
-                        <a:buSzTx/>
-                        <a:buFont typeface="Arial"/>
-                        <a:buNone/>
-                        <a:tabLst/>
-                        <a:defRPr/>
-                      </a:pPr>
-                      <a:r>
-                        <a:rPr lang="en-US" sz="800" dirty="0"/>
-                        <a:t>Holiday date</a:t>
-                      </a:r>
-                    </a:p>
-                  </a:txBody>
-                  <a:tcPr/>
-                </a:tc>
-                <a:tc>
-                  <a:txBody>
-                    <a:bodyPr/>
-                    <a:lstStyle/>
-                    <a:p>
-                      <a:pPr marL="0" marR="0" lvl="0" indent="0" algn="l" defTabSz="914400" rtl="0" eaLnBrk="1" fontAlgn="auto" latinLnBrk="0" hangingPunct="1">
-                        <a:lnSpc>
-                          <a:spcPct val="100000"/>
-                        </a:lnSpc>
-                        <a:spcBef>
-                          <a:spcPts val="0"/>
-                        </a:spcBef>
-                        <a:spcAft>
-                          <a:spcPts val="0"/>
-                        </a:spcAft>
-                        <a:buClr>
-                          <a:srgbClr val="000000"/>
-                        </a:buClr>
-                        <a:buSzTx/>
-                        <a:buFont typeface="Arial"/>
-                        <a:buNone/>
-                        <a:tabLst/>
-                        <a:defRPr/>
-                      </a:pPr>
-                      <a:endParaRPr lang="en-US" sz="800" dirty="0"/>
-                    </a:p>
-                  </a:txBody>
-                  <a:tcPr/>
-                </a:tc>
-                <a:tc>
-                  <a:txBody>
-                    <a:bodyPr/>
-                    <a:lstStyle/>
-                    <a:p>
-                      <a:r>
-                        <a:rPr lang="en-US" sz="800" dirty="0"/>
-                        <a:t>mm-dd-</a:t>
-                      </a:r>
-                      <a:r>
-                        <a:rPr lang="en-US" sz="800" dirty="0" err="1"/>
-                        <a:t>yyyy</a:t>
-                      </a:r>
-                      <a:endParaRPr lang="en-US" sz="800" dirty="0"/>
-                    </a:p>
-                  </a:txBody>
-                  <a:tcPr/>
-                </a:tc>
-                <a:extLst>
-                  <a:ext uri="{0D108BD9-81ED-4DB2-BD59-A6C34878D82A}">
-                    <a16:rowId xmlns:a16="http://schemas.microsoft.com/office/drawing/2014/main" val="1757594505"/>
-                  </a:ext>
-                </a:extLst>
-              </a:tr>
-              <a:tr h="0">
-                <a:tc>
-                  <a:txBody>
-                    <a:bodyPr/>
-                    <a:lstStyle/>
-                    <a:p>
-                      <a:pPr marL="0" marR="0" lvl="0" indent="0" algn="l" defTabSz="914400" rtl="0" eaLnBrk="1" fontAlgn="auto" latinLnBrk="0" hangingPunct="1">
-                        <a:lnSpc>
-                          <a:spcPct val="100000"/>
-                        </a:lnSpc>
-                        <a:spcBef>
-                          <a:spcPts val="0"/>
-                        </a:spcBef>
-                        <a:spcAft>
-                          <a:spcPts val="0"/>
-                        </a:spcAft>
-                        <a:buClr>
-                          <a:srgbClr val="000000"/>
-                        </a:buClr>
-                        <a:buSzTx/>
-                        <a:buFont typeface="Arial"/>
-                        <a:buNone/>
-                        <a:tabLst/>
-                        <a:defRPr/>
-                      </a:pPr>
-                      <a:r>
-                        <a:rPr lang="en-US" sz="800" dirty="0"/>
-                        <a:t>Sold date</a:t>
-                      </a:r>
-                    </a:p>
-                  </a:txBody>
-                  <a:tcPr/>
-                </a:tc>
-                <a:tc>
-                  <a:txBody>
-                    <a:bodyPr/>
-                    <a:lstStyle/>
-                    <a:p>
-                      <a:pPr marL="0" marR="0" lvl="0" indent="0" algn="l" defTabSz="914400" rtl="0" eaLnBrk="1" fontAlgn="auto" latinLnBrk="0" hangingPunct="1">
-                        <a:lnSpc>
-                          <a:spcPct val="100000"/>
-                        </a:lnSpc>
-                        <a:spcBef>
-                          <a:spcPts val="0"/>
-                        </a:spcBef>
-                        <a:spcAft>
-                          <a:spcPts val="0"/>
-                        </a:spcAft>
-                        <a:buClr>
-                          <a:srgbClr val="000000"/>
-                        </a:buClr>
-                        <a:buSzTx/>
-                        <a:buFont typeface="Arial"/>
-                        <a:buNone/>
-                        <a:tabLst/>
-                        <a:defRPr/>
-                      </a:pPr>
-                      <a:endParaRPr lang="en-US" sz="800" dirty="0"/>
-                    </a:p>
-                  </a:txBody>
-                  <a:tcPr/>
-                </a:tc>
-                <a:tc>
-                  <a:txBody>
-                    <a:bodyPr/>
-                    <a:lstStyle/>
-                    <a:p>
-                      <a:pPr marL="0" marR="0" lvl="0" indent="0" algn="l" defTabSz="914400" rtl="0" eaLnBrk="1" fontAlgn="auto" latinLnBrk="0" hangingPunct="1">
-                        <a:lnSpc>
-                          <a:spcPct val="100000"/>
-                        </a:lnSpc>
-                        <a:spcBef>
-                          <a:spcPts val="0"/>
-                        </a:spcBef>
-                        <a:spcAft>
-                          <a:spcPts val="0"/>
-                        </a:spcAft>
-                        <a:buClr>
-                          <a:srgbClr val="000000"/>
-                        </a:buClr>
-                        <a:buSzTx/>
-                        <a:buFont typeface="Arial"/>
-                        <a:buNone/>
-                        <a:tabLst/>
-                        <a:defRPr/>
-                      </a:pPr>
-                      <a:r>
-                        <a:rPr lang="en-US" sz="800" dirty="0"/>
-                        <a:t>mm-dd-</a:t>
-                      </a:r>
-                      <a:r>
-                        <a:rPr lang="en-US" sz="800" dirty="0" err="1"/>
-                        <a:t>yyyy</a:t>
-                      </a:r>
-                      <a:endParaRPr lang="en-US" sz="800" dirty="0"/>
-                    </a:p>
-                  </a:txBody>
-                  <a:tcPr/>
-                </a:tc>
-                <a:extLst>
-                  <a:ext uri="{0D108BD9-81ED-4DB2-BD59-A6C34878D82A}">
-                    <a16:rowId xmlns:a16="http://schemas.microsoft.com/office/drawing/2014/main" val="3193344423"/>
-                  </a:ext>
-                </a:extLst>
-              </a:tr>
-              <a:tr h="0">
-                <a:tc>
-                  <a:txBody>
-                    <a:bodyPr/>
-                    <a:lstStyle/>
-                    <a:p>
-                      <a:pPr marL="0" marR="0" lvl="0" indent="0" algn="l" defTabSz="914400" rtl="0" eaLnBrk="1" fontAlgn="auto" latinLnBrk="0" hangingPunct="1">
-                        <a:lnSpc>
-                          <a:spcPct val="100000"/>
-                        </a:lnSpc>
-                        <a:spcBef>
-                          <a:spcPts val="0"/>
-                        </a:spcBef>
-                        <a:spcAft>
-                          <a:spcPts val="0"/>
-                        </a:spcAft>
-                        <a:buClr>
-                          <a:srgbClr val="000000"/>
-                        </a:buClr>
-                        <a:buSzTx/>
-                        <a:buFont typeface="Arial"/>
-                        <a:buNone/>
-                        <a:tabLst/>
-                        <a:defRPr/>
-                      </a:pPr>
-                      <a:r>
-                        <a:rPr lang="en-US" sz="800" dirty="0"/>
-                        <a:t>Sold Quantity</a:t>
-                      </a:r>
-                    </a:p>
-                  </a:txBody>
-                  <a:tcPr/>
-                </a:tc>
-                <a:tc>
-                  <a:txBody>
-                    <a:bodyPr/>
-                    <a:lstStyle/>
-                    <a:p>
-                      <a:pPr marL="0" marR="0" lvl="0" indent="0" algn="l" defTabSz="914400" rtl="0" eaLnBrk="1" fontAlgn="auto" latinLnBrk="0" hangingPunct="1">
-                        <a:lnSpc>
-                          <a:spcPct val="100000"/>
-                        </a:lnSpc>
-                        <a:spcBef>
-                          <a:spcPts val="0"/>
-                        </a:spcBef>
-                        <a:spcAft>
-                          <a:spcPts val="0"/>
-                        </a:spcAft>
-                        <a:buClr>
-                          <a:srgbClr val="000000"/>
-                        </a:buClr>
-                        <a:buSzTx/>
-                        <a:buFont typeface="Arial"/>
-                        <a:buNone/>
-                        <a:tabLst/>
-                        <a:defRPr/>
-                      </a:pPr>
-                      <a:r>
-                        <a:rPr lang="en-US" sz="800" dirty="0"/>
-                        <a:t>Integer</a:t>
-                      </a:r>
-                    </a:p>
-                  </a:txBody>
-                  <a:tcPr/>
-                </a:tc>
-                <a:tc>
-                  <a:txBody>
-                    <a:bodyPr/>
-                    <a:lstStyle/>
-                    <a:p>
-                      <a:endParaRPr lang="en-US" sz="800" dirty="0"/>
-                    </a:p>
-                  </a:txBody>
-                  <a:tcPr/>
-                </a:tc>
-                <a:extLst>
-                  <a:ext uri="{0D108BD9-81ED-4DB2-BD59-A6C34878D82A}">
-                    <a16:rowId xmlns:a16="http://schemas.microsoft.com/office/drawing/2014/main" val="3722479841"/>
-                  </a:ext>
-                </a:extLst>
-              </a:tr>
-              <a:tr h="0">
-                <a:tc>
-                  <a:txBody>
-                    <a:bodyPr/>
-                    <a:lstStyle/>
-                    <a:p>
-                      <a:pPr marL="0" marR="0" lvl="0" indent="0" algn="l" defTabSz="914400" rtl="0" eaLnBrk="1" fontAlgn="auto" latinLnBrk="0" hangingPunct="1">
-                        <a:lnSpc>
-                          <a:spcPct val="100000"/>
-                        </a:lnSpc>
-                        <a:spcBef>
-                          <a:spcPts val="0"/>
-                        </a:spcBef>
-                        <a:spcAft>
-                          <a:spcPts val="0"/>
-                        </a:spcAft>
-                        <a:buClr>
-                          <a:srgbClr val="000000"/>
-                        </a:buClr>
-                        <a:buSzTx/>
-                        <a:buFont typeface="Arial"/>
-                        <a:buNone/>
-                        <a:tabLst/>
-                        <a:defRPr/>
-                      </a:pPr>
-                      <a:endParaRPr lang="en-US" sz="800" dirty="0"/>
-                    </a:p>
-                  </a:txBody>
-                  <a:tcPr/>
-                </a:tc>
-                <a:tc>
-                  <a:txBody>
-                    <a:bodyPr/>
-                    <a:lstStyle/>
-                    <a:p>
-                      <a:pPr marL="0" marR="0" lvl="0" indent="0" algn="l" defTabSz="914400" rtl="0" eaLnBrk="1" fontAlgn="auto" latinLnBrk="0" hangingPunct="1">
-                        <a:lnSpc>
-                          <a:spcPct val="100000"/>
-                        </a:lnSpc>
-                        <a:spcBef>
-                          <a:spcPts val="0"/>
-                        </a:spcBef>
-                        <a:spcAft>
-                          <a:spcPts val="0"/>
-                        </a:spcAft>
-                        <a:buClr>
-                          <a:srgbClr val="000000"/>
-                        </a:buClr>
-                        <a:buSzTx/>
-                        <a:buFont typeface="Arial"/>
-                        <a:buNone/>
-                        <a:tabLst/>
-                        <a:defRPr/>
-                      </a:pPr>
-                      <a:endParaRPr lang="en-US" sz="800" dirty="0"/>
-                    </a:p>
-                  </a:txBody>
-                  <a:tcPr/>
-                </a:tc>
-                <a:tc>
-                  <a:txBody>
-                    <a:bodyPr/>
-                    <a:lstStyle/>
-                    <a:p>
-                      <a:endParaRPr lang="en-US" sz="800" dirty="0"/>
-                    </a:p>
-                  </a:txBody>
-                  <a:tcPr/>
-                </a:tc>
-                <a:extLst>
-                  <a:ext uri="{0D108BD9-81ED-4DB2-BD59-A6C34878D82A}">
-                    <a16:rowId xmlns:a16="http://schemas.microsoft.com/office/drawing/2014/main" val="3599112174"/>
-                  </a:ext>
-                </a:extLst>
-              </a:tr>
-              <a:tr h="0">
-                <a:tc>
-                  <a:txBody>
-                    <a:bodyPr/>
-                    <a:lstStyle/>
-                    <a:p>
-                      <a:pPr marL="0" marR="0" lvl="0" indent="0" algn="l" defTabSz="914400" rtl="0" eaLnBrk="1" fontAlgn="auto" latinLnBrk="0" hangingPunct="1">
-                        <a:lnSpc>
-                          <a:spcPct val="100000"/>
-                        </a:lnSpc>
-                        <a:spcBef>
-                          <a:spcPts val="0"/>
-                        </a:spcBef>
-                        <a:spcAft>
-                          <a:spcPts val="0"/>
-                        </a:spcAft>
-                        <a:buClr>
-                          <a:srgbClr val="000000"/>
-                        </a:buClr>
-                        <a:buSzTx/>
-                        <a:buFont typeface="Arial"/>
-                        <a:buNone/>
-                        <a:tabLst/>
-                        <a:defRPr/>
-                      </a:pPr>
-                      <a:endParaRPr lang="en-US" sz="800" dirty="0"/>
-                    </a:p>
-                  </a:txBody>
-                  <a:tcPr/>
-                </a:tc>
-                <a:tc>
-                  <a:txBody>
-                    <a:bodyPr/>
-                    <a:lstStyle/>
-                    <a:p>
-                      <a:pPr marL="0" marR="0" lvl="0" indent="0" algn="l" defTabSz="914400" rtl="0" eaLnBrk="1" fontAlgn="auto" latinLnBrk="0" hangingPunct="1">
-                        <a:lnSpc>
-                          <a:spcPct val="100000"/>
-                        </a:lnSpc>
-                        <a:spcBef>
-                          <a:spcPts val="0"/>
-                        </a:spcBef>
-                        <a:spcAft>
-                          <a:spcPts val="0"/>
-                        </a:spcAft>
-                        <a:buClr>
-                          <a:srgbClr val="000000"/>
-                        </a:buClr>
-                        <a:buSzTx/>
-                        <a:buFont typeface="Arial"/>
-                        <a:buNone/>
-                        <a:tabLst/>
-                        <a:defRPr/>
-                      </a:pPr>
-                      <a:endParaRPr lang="en-US" sz="800" dirty="0"/>
-                    </a:p>
-                  </a:txBody>
-                  <a:tcPr/>
-                </a:tc>
-                <a:tc>
-                  <a:txBody>
-                    <a:bodyPr/>
-                    <a:lstStyle/>
-                    <a:p>
-                      <a:endParaRPr lang="en-US" sz="800" dirty="0"/>
-                    </a:p>
-                  </a:txBody>
-                  <a:tcPr/>
-                </a:tc>
-                <a:extLst>
-                  <a:ext uri="{0D108BD9-81ED-4DB2-BD59-A6C34878D82A}">
-                    <a16:rowId xmlns:a16="http://schemas.microsoft.com/office/drawing/2014/main" val="4075383918"/>
-                  </a:ext>
-                </a:extLst>
-              </a:tr>
-              <a:tr h="0">
-                <a:tc>
-                  <a:txBody>
-                    <a:bodyPr/>
-                    <a:lstStyle/>
-                    <a:p>
-                      <a:pPr marL="0" marR="0" lvl="0" indent="0" algn="l" defTabSz="914400" rtl="0" eaLnBrk="1" fontAlgn="auto" latinLnBrk="0" hangingPunct="1">
-                        <a:lnSpc>
-                          <a:spcPct val="100000"/>
-                        </a:lnSpc>
-                        <a:spcBef>
-                          <a:spcPts val="0"/>
-                        </a:spcBef>
-                        <a:spcAft>
-                          <a:spcPts val="0"/>
-                        </a:spcAft>
-                        <a:buClr>
-                          <a:srgbClr val="000000"/>
-                        </a:buClr>
-                        <a:buSzTx/>
-                        <a:buFont typeface="Arial"/>
-                        <a:buNone/>
-                        <a:tabLst/>
-                        <a:defRPr/>
-                      </a:pPr>
-                      <a:endParaRPr lang="en-US" sz="800" dirty="0"/>
-                    </a:p>
-                  </a:txBody>
-                  <a:tcPr/>
-                </a:tc>
-                <a:tc>
-                  <a:txBody>
-                    <a:bodyPr/>
-                    <a:lstStyle/>
-                    <a:p>
-                      <a:pPr marL="0" marR="0" lvl="0" indent="0" algn="l" defTabSz="914400" rtl="0" eaLnBrk="1" fontAlgn="auto" latinLnBrk="0" hangingPunct="1">
-                        <a:lnSpc>
-                          <a:spcPct val="100000"/>
-                        </a:lnSpc>
-                        <a:spcBef>
-                          <a:spcPts val="0"/>
-                        </a:spcBef>
-                        <a:spcAft>
-                          <a:spcPts val="0"/>
-                        </a:spcAft>
-                        <a:buClr>
-                          <a:srgbClr val="000000"/>
-                        </a:buClr>
-                        <a:buSzTx/>
-                        <a:buFont typeface="Arial"/>
-                        <a:buNone/>
-                        <a:tabLst/>
-                        <a:defRPr/>
-                      </a:pPr>
-                      <a:endParaRPr lang="en-US" sz="800" dirty="0"/>
-                    </a:p>
-                  </a:txBody>
-                  <a:tcPr/>
-                </a:tc>
-                <a:tc>
-                  <a:txBody>
-                    <a:bodyPr/>
-                    <a:lstStyle/>
-                    <a:p>
-                      <a:endParaRPr lang="en-US" sz="800" dirty="0"/>
-                    </a:p>
-                  </a:txBody>
-                  <a:tcPr/>
-                </a:tc>
-                <a:extLst>
-                  <a:ext uri="{0D108BD9-81ED-4DB2-BD59-A6C34878D82A}">
-                    <a16:rowId xmlns:a16="http://schemas.microsoft.com/office/drawing/2014/main" val="2351806370"/>
-                  </a:ext>
-                </a:extLst>
-              </a:tr>
-              <a:tr h="0">
-                <a:tc>
-                  <a:txBody>
-                    <a:bodyPr/>
-                    <a:lstStyle/>
-                    <a:p>
-                      <a:pPr marL="0" marR="0" lvl="0" indent="0" algn="l" defTabSz="914400" rtl="0" eaLnBrk="1" fontAlgn="auto" latinLnBrk="0" hangingPunct="1">
-                        <a:lnSpc>
-                          <a:spcPct val="100000"/>
-                        </a:lnSpc>
-                        <a:spcBef>
-                          <a:spcPts val="0"/>
-                        </a:spcBef>
-                        <a:spcAft>
-                          <a:spcPts val="0"/>
-                        </a:spcAft>
-                        <a:buClr>
-                          <a:srgbClr val="000000"/>
-                        </a:buClr>
-                        <a:buSzTx/>
-                        <a:buFont typeface="Arial"/>
-                        <a:buNone/>
-                        <a:tabLst/>
-                        <a:defRPr/>
-                      </a:pPr>
-                      <a:endParaRPr lang="en-US" sz="800" dirty="0"/>
-                    </a:p>
-                  </a:txBody>
-                  <a:tcPr/>
-                </a:tc>
-                <a:tc>
-                  <a:txBody>
-                    <a:bodyPr/>
-                    <a:lstStyle/>
-                    <a:p>
-                      <a:pPr marL="0" marR="0" lvl="0" indent="0" algn="l" defTabSz="914400" rtl="0" eaLnBrk="1" fontAlgn="auto" latinLnBrk="0" hangingPunct="1">
-                        <a:lnSpc>
-                          <a:spcPct val="100000"/>
-                        </a:lnSpc>
-                        <a:spcBef>
-                          <a:spcPts val="0"/>
-                        </a:spcBef>
-                        <a:spcAft>
-                          <a:spcPts val="0"/>
-                        </a:spcAft>
-                        <a:buClr>
-                          <a:srgbClr val="000000"/>
-                        </a:buClr>
-                        <a:buSzTx/>
-                        <a:buFont typeface="Arial"/>
-                        <a:buNone/>
-                        <a:tabLst/>
-                        <a:defRPr/>
-                      </a:pPr>
-                      <a:endParaRPr lang="en-US" sz="800" dirty="0"/>
-                    </a:p>
-                  </a:txBody>
-                  <a:tcPr/>
-                </a:tc>
-                <a:tc>
-                  <a:txBody>
-                    <a:bodyPr/>
-                    <a:lstStyle/>
-                    <a:p>
-                      <a:endParaRPr lang="en-US" sz="800" dirty="0"/>
-                    </a:p>
-                  </a:txBody>
-                  <a:tcPr/>
-                </a:tc>
-                <a:extLst>
-                  <a:ext uri="{0D108BD9-81ED-4DB2-BD59-A6C34878D82A}">
-                    <a16:rowId xmlns:a16="http://schemas.microsoft.com/office/drawing/2014/main" val="1964201980"/>
-                  </a:ext>
-                </a:extLst>
-              </a:tr>
-            </a:tbl>
-          </a:graphicData>
-        </a:graphic>
-      </p:graphicFrame>
-    </p:spTree>
-    <p:extLst>
-      <p:ext uri="{BB962C8B-B14F-4D97-AF65-F5344CB8AC3E}">
-        <p14:creationId xmlns:p14="http://schemas.microsoft.com/office/powerpoint/2010/main" val="619591483"/>
-      </p:ext>
-    </p:extLst>
   </p:cSld>
   <p:clrMapOvr>
     <a:masterClrMapping/>

</xml_diff>

<commit_message>
started slide for Task Decomposition and Abstract code for Login and View Holiday tasks
</commit_message>
<xml_diff>
--- a/CS6400 project phase one.pptx
+++ b/CS6400 project phase one.pptx
@@ -11476,10 +11476,10 @@
               <a:buNone/>
             </a:pPr>
             <a:r>
-              <a:rPr lang="en"/>
+              <a:rPr lang="en" dirty="0"/>
               <a:t>Log in </a:t>
             </a:r>
-            <a:endParaRPr/>
+            <a:endParaRPr dirty="0"/>
           </a:p>
           <a:p>
             <a:pPr marL="0" lvl="0" indent="0" algn="l" rtl="0">
@@ -11492,10 +11492,10 @@
               <a:buNone/>
             </a:pPr>
             <a:r>
-              <a:rPr lang="en"/>
+              <a:rPr lang="en" dirty="0"/>
               <a:t>View Statistics (main menu)</a:t>
             </a:r>
-            <a:endParaRPr/>
+            <a:endParaRPr dirty="0"/>
           </a:p>
           <a:p>
             <a:pPr marL="0" lvl="0" indent="0" algn="l" rtl="0">
@@ -11508,10 +11508,10 @@
               <a:buNone/>
             </a:pPr>
             <a:r>
-              <a:rPr lang="en"/>
+              <a:rPr lang="en" dirty="0"/>
               <a:t>View reports</a:t>
             </a:r>
-            <a:endParaRPr/>
+            <a:endParaRPr dirty="0"/>
           </a:p>
           <a:p>
             <a:pPr marL="0" lvl="0" indent="0" algn="l" rtl="0">
@@ -11524,10 +11524,10 @@
               <a:buNone/>
             </a:pPr>
             <a:r>
-              <a:rPr lang="en"/>
+              <a:rPr lang="en" dirty="0"/>
               <a:t>View Holidays</a:t>
             </a:r>
-            <a:endParaRPr/>
+            <a:endParaRPr dirty="0"/>
           </a:p>
           <a:p>
             <a:pPr marL="0" lvl="0" indent="0" algn="l" rtl="0">
@@ -11540,10 +11540,10 @@
               <a:buNone/>
             </a:pPr>
             <a:r>
-              <a:rPr lang="en"/>
+              <a:rPr lang="en" dirty="0"/>
               <a:t>Edit Holidays</a:t>
             </a:r>
-            <a:endParaRPr/>
+            <a:endParaRPr dirty="0"/>
           </a:p>
           <a:p>
             <a:pPr marL="0" lvl="0" indent="0" algn="l" rtl="0">
@@ -11556,10 +11556,10 @@
               <a:buNone/>
             </a:pPr>
             <a:r>
-              <a:rPr lang="en"/>
+              <a:rPr lang="en" dirty="0"/>
               <a:t>View audit log</a:t>
             </a:r>
-            <a:endParaRPr/>
+            <a:endParaRPr dirty="0"/>
           </a:p>
           <a:p>
             <a:pPr marL="0" lvl="0" indent="0" algn="l" rtl="0">
@@ -11571,7 +11571,7 @@
               </a:spcAft>
               <a:buNone/>
             </a:pPr>
-            <a:endParaRPr/>
+            <a:endParaRPr dirty="0"/>
           </a:p>
         </p:txBody>
       </p:sp>

</xml_diff>